<commit_message>
GAM320 & 340 L1
</commit_message>
<xml_diff>
--- a/GAM320/01/GAM320_01_lecture.pptx
+++ b/GAM320/01/GAM320_01_lecture.pptx
@@ -5,14 +5,23 @@
     <p:sldMasterId id="2147483648" r:id="rId1"/>
   </p:sldMasterIdLst>
   <p:notesMasterIdLst>
-    <p:notesMasterId r:id="rId4"/>
+    <p:notesMasterId r:id="rId13"/>
   </p:notesMasterIdLst>
   <p:handoutMasterIdLst>
-    <p:handoutMasterId r:id="rId5"/>
+    <p:handoutMasterId r:id="rId14"/>
   </p:handoutMasterIdLst>
   <p:sldIdLst>
     <p:sldId id="257" r:id="rId2"/>
-    <p:sldId id="409" r:id="rId3"/>
+    <p:sldId id="334" r:id="rId3"/>
+    <p:sldId id="421" r:id="rId4"/>
+    <p:sldId id="422" r:id="rId5"/>
+    <p:sldId id="416" r:id="rId6"/>
+    <p:sldId id="423" r:id="rId7"/>
+    <p:sldId id="332" r:id="rId8"/>
+    <p:sldId id="410" r:id="rId9"/>
+    <p:sldId id="425" r:id="rId10"/>
+    <p:sldId id="426" r:id="rId11"/>
+    <p:sldId id="424" r:id="rId12"/>
   </p:sldIdLst>
   <p:sldSz cx="9144000" cy="6858000" type="screen4x3"/>
   <p:notesSz cx="7315200" cy="9601200"/>
@@ -951,7 +960,7 @@
             <a:fld id="{134C908B-E4CF-4B88-8994-49C91B4DAC10}" type="datetimeFigureOut">
               <a:rPr lang="en-US" smtClean="0"/>
               <a:pPr/>
-              <a:t>9/11/19</a:t>
+              <a:t>9/19/19</a:t>
             </a:fld>
             <a:endParaRPr lang="en-US"/>
           </a:p>
@@ -1113,7 +1122,7 @@
             <a:fld id="{FCD4ED34-E2A7-4A73-B53B-08CB721EE63F}" type="datetimeFigureOut">
               <a:rPr lang="en-US" smtClean="0"/>
               <a:pPr/>
-              <a:t>9/11/19</a:t>
+              <a:t>9/19/19</a:t>
             </a:fld>
             <a:endParaRPr lang="en-GB"/>
           </a:p>
@@ -1576,7 +1585,7 @@
             <a:fld id="{24C0EDFE-3590-4448-BF7B-7FB41E82085F}" type="datetimeFigureOut">
               <a:rPr lang="en-US" smtClean="0"/>
               <a:pPr/>
-              <a:t>9/11/19</a:t>
+              <a:t>9/19/19</a:t>
             </a:fld>
             <a:endParaRPr lang="en-US" dirty="0"/>
           </a:p>
@@ -1765,7 +1774,7 @@
             <a:fld id="{24C0EDFE-3590-4448-BF7B-7FB41E82085F}" type="datetimeFigureOut">
               <a:rPr lang="en-US" smtClean="0"/>
               <a:pPr/>
-              <a:t>9/11/19</a:t>
+              <a:t>9/19/19</a:t>
             </a:fld>
             <a:endParaRPr lang="en-US" dirty="0"/>
           </a:p>
@@ -1943,7 +1952,7 @@
             <a:fld id="{24C0EDFE-3590-4448-BF7B-7FB41E82085F}" type="datetimeFigureOut">
               <a:rPr lang="en-US" smtClean="0"/>
               <a:pPr/>
-              <a:t>9/11/19</a:t>
+              <a:t>9/19/19</a:t>
             </a:fld>
             <a:endParaRPr lang="en-US" dirty="0"/>
           </a:p>
@@ -2192,7 +2201,7 @@
             <a:fld id="{24C0EDFE-3590-4448-BF7B-7FB41E82085F}" type="datetimeFigureOut">
               <a:rPr lang="en-US" smtClean="0"/>
               <a:pPr/>
-              <a:t>9/11/19</a:t>
+              <a:t>9/19/19</a:t>
             </a:fld>
             <a:endParaRPr lang="en-US" dirty="0"/>
           </a:p>
@@ -2514,7 +2523,7 @@
             <a:fld id="{24C0EDFE-3590-4448-BF7B-7FB41E82085F}" type="datetimeFigureOut">
               <a:rPr lang="en-US" smtClean="0"/>
               <a:pPr/>
-              <a:t>9/11/19</a:t>
+              <a:t>9/19/19</a:t>
             </a:fld>
             <a:endParaRPr lang="en-US" dirty="0"/>
           </a:p>
@@ -2820,7 +2829,7 @@
             <a:fld id="{24C0EDFE-3590-4448-BF7B-7FB41E82085F}" type="datetimeFigureOut">
               <a:rPr lang="en-US" smtClean="0"/>
               <a:pPr/>
-              <a:t>9/11/19</a:t>
+              <a:t>9/19/19</a:t>
             </a:fld>
             <a:endParaRPr lang="en-US" dirty="0"/>
           </a:p>
@@ -3244,7 +3253,7 @@
             <a:fld id="{24C0EDFE-3590-4448-BF7B-7FB41E82085F}" type="datetimeFigureOut">
               <a:rPr lang="en-US" smtClean="0"/>
               <a:pPr/>
-              <a:t>9/11/19</a:t>
+              <a:t>9/19/19</a:t>
             </a:fld>
             <a:endParaRPr lang="en-US" dirty="0"/>
           </a:p>
@@ -3366,7 +3375,7 @@
             <a:fld id="{24C0EDFE-3590-4448-BF7B-7FB41E82085F}" type="datetimeFigureOut">
               <a:rPr lang="en-US" smtClean="0"/>
               <a:pPr/>
-              <a:t>9/11/19</a:t>
+              <a:t>9/19/19</a:t>
             </a:fld>
             <a:endParaRPr lang="en-US" dirty="0"/>
           </a:p>
@@ -3458,7 +3467,7 @@
             <a:fld id="{24C0EDFE-3590-4448-BF7B-7FB41E82085F}" type="datetimeFigureOut">
               <a:rPr lang="en-US" smtClean="0"/>
               <a:pPr/>
-              <a:t>9/11/19</a:t>
+              <a:t>9/19/19</a:t>
             </a:fld>
             <a:endParaRPr lang="en-US" dirty="0"/>
           </a:p>
@@ -3733,7 +3742,7 @@
             <a:fld id="{24C0EDFE-3590-4448-BF7B-7FB41E82085F}" type="datetimeFigureOut">
               <a:rPr lang="en-US" smtClean="0"/>
               <a:pPr/>
-              <a:t>9/11/19</a:t>
+              <a:t>9/19/19</a:t>
             </a:fld>
             <a:endParaRPr lang="en-US" dirty="0"/>
           </a:p>
@@ -3985,7 +3994,7 @@
             <a:fld id="{24C0EDFE-3590-4448-BF7B-7FB41E82085F}" type="datetimeFigureOut">
               <a:rPr lang="en-US" smtClean="0"/>
               <a:pPr/>
-              <a:t>9/11/19</a:t>
+              <a:t>9/19/19</a:t>
             </a:fld>
             <a:endParaRPr lang="en-US" dirty="0"/>
           </a:p>
@@ -4162,7 +4171,7 @@
             <a:fld id="{24C0EDFE-3590-4448-BF7B-7FB41E82085F}" type="datetimeFigureOut">
               <a:rPr lang="en-US" smtClean="0"/>
               <a:pPr/>
-              <a:t>9/11/19</a:t>
+              <a:t>9/19/19</a:t>
             </a:fld>
             <a:endParaRPr lang="en-US" dirty="0"/>
           </a:p>
@@ -4827,36 +4836,14 @@
           </a:bodyPr>
           <a:lstStyle/>
           <a:p>
-            <a:pPr marL="0" marR="0" lvl="0" indent="0" defTabSz="914400" rtl="0" eaLnBrk="1" fontAlgn="base" latinLnBrk="0" hangingPunct="1">
-              <a:lnSpc>
-                <a:spcPct val="100000"/>
-              </a:lnSpc>
+            <a:pPr lvl="0" fontAlgn="base">
               <a:spcBef>
                 <a:spcPct val="0"/>
               </a:spcBef>
               <a:spcAft>
                 <a:spcPct val="0"/>
               </a:spcAft>
-              <a:buClrTx/>
-              <a:buSzTx/>
-              <a:buFontTx/>
-              <a:buNone/>
-              <a:tabLst/>
             </a:pPr>
-            <a:r>
-              <a:rPr kumimoji="0" lang="en-US" sz="3600" b="0" i="0" u="none" strike="noStrike" cap="none" normalizeH="0" baseline="0" dirty="0">
-                <a:ln>
-                  <a:noFill/>
-                </a:ln>
-                <a:solidFill>
-                  <a:srgbClr val="FFFFFF"/>
-                </a:solidFill>
-                <a:effectLst/>
-                <a:latin typeface="Calibri" pitchFamily="34" charset="0"/>
-                <a:cs typeface="Calibri" pitchFamily="34" charset="0"/>
-              </a:rPr>
-              <a:t>Lecture </a:t>
-            </a:r>
             <a:r>
               <a:rPr lang="en-US" sz="3600" dirty="0">
                 <a:solidFill>
@@ -4865,16 +4852,9 @@
                 <a:latin typeface="Calibri" pitchFamily="34" charset="0"/>
                 <a:cs typeface="Calibri" pitchFamily="34" charset="0"/>
               </a:rPr>
-              <a:t>X: Placeholder</a:t>
-            </a:r>
-            <a:endParaRPr kumimoji="0" lang="en-US" sz="1800" b="0" i="0" u="none" strike="noStrike" cap="none" normalizeH="0" baseline="0" dirty="0">
-              <a:ln>
-                <a:noFill/>
-              </a:ln>
-              <a:solidFill>
-                <a:schemeClr val="tx1"/>
-              </a:solidFill>
-              <a:effectLst/>
+              <a:t>Lecture 1: Module Introduction</a:t>
+            </a:r>
+            <a:endParaRPr lang="en-US" dirty="0">
               <a:latin typeface="Arial" pitchFamily="34" charset="0"/>
               <a:cs typeface="Arial" pitchFamily="34" charset="0"/>
             </a:endParaRPr>
@@ -4882,6 +4862,210 @@
         </p:txBody>
       </p:sp>
     </p:spTree>
+  </p:cSld>
+  <p:clrMapOvr>
+    <a:masterClrMapping/>
+  </p:clrMapOvr>
+</p:sld>
+</file>
+
+<file path=ppt/slides/slide10.xml><?xml version="1.0" encoding="utf-8"?>
+<p:sld xmlns:a="http://schemas.openxmlformats.org/drawingml/2006/main" xmlns:r="http://schemas.openxmlformats.org/officeDocument/2006/relationships" xmlns:p="http://schemas.openxmlformats.org/presentationml/2006/main">
+  <p:cSld>
+    <p:spTree>
+      <p:nvGrpSpPr>
+        <p:cNvPr id="1" name=""/>
+        <p:cNvGrpSpPr/>
+        <p:nvPr/>
+      </p:nvGrpSpPr>
+      <p:grpSpPr>
+        <a:xfrm>
+          <a:off x="0" y="0"/>
+          <a:ext cx="0" cy="0"/>
+          <a:chOff x="0" y="0"/>
+          <a:chExt cx="0" cy="0"/>
+        </a:xfrm>
+      </p:grpSpPr>
+      <p:sp>
+        <p:nvSpPr>
+          <p:cNvPr id="3" name="Content Placeholder 2"/>
+          <p:cNvSpPr>
+            <a:spLocks noGrp="1"/>
+          </p:cNvSpPr>
+          <p:nvPr>
+            <p:ph idx="1"/>
+          </p:nvPr>
+        </p:nvSpPr>
+        <p:spPr>
+          <a:xfrm>
+            <a:off x="457200" y="548680"/>
+            <a:ext cx="8229600" cy="6192688"/>
+          </a:xfrm>
+        </p:spPr>
+        <p:txBody>
+          <a:bodyPr>
+            <a:normAutofit/>
+          </a:bodyPr>
+          <a:lstStyle/>
+          <a:p>
+            <a:r>
+              <a:rPr lang="en-GB" dirty="0"/>
+              <a:t>Meeting procedures</a:t>
+            </a:r>
+          </a:p>
+          <a:p>
+            <a:pPr lvl="1"/>
+            <a:endParaRPr lang="en-GB" dirty="0"/>
+          </a:p>
+          <a:p>
+            <a:pPr lvl="1"/>
+            <a:endParaRPr lang="en-GB" dirty="0"/>
+          </a:p>
+        </p:txBody>
+      </p:sp>
+      <p:pic>
+        <p:nvPicPr>
+          <p:cNvPr id="2" name="Picture 1">
+            <a:extLst>
+              <a:ext uri="{FF2B5EF4-FFF2-40B4-BE49-F238E27FC236}">
+                <a16:creationId xmlns:a16="http://schemas.microsoft.com/office/drawing/2014/main" id="{2BF82DF9-47CE-374B-99A8-7A20C6B8AC17}"/>
+              </a:ext>
+            </a:extLst>
+          </p:cNvPr>
+          <p:cNvPicPr>
+            <a:picLocks noChangeAspect="1"/>
+          </p:cNvPicPr>
+          <p:nvPr/>
+        </p:nvPicPr>
+        <p:blipFill rotWithShape="1">
+          <a:blip r:embed="rId2"/>
+          <a:srcRect b="67476"/>
+          <a:stretch/>
+        </p:blipFill>
+        <p:spPr>
+          <a:xfrm>
+            <a:off x="683568" y="1574800"/>
+            <a:ext cx="3240360" cy="1911424"/>
+          </a:xfrm>
+          <a:prstGeom prst="rect">
+            <a:avLst/>
+          </a:prstGeom>
+        </p:spPr>
+      </p:pic>
+      <p:pic>
+        <p:nvPicPr>
+          <p:cNvPr id="7" name="Picture 6">
+            <a:extLst>
+              <a:ext uri="{FF2B5EF4-FFF2-40B4-BE49-F238E27FC236}">
+                <a16:creationId xmlns:a16="http://schemas.microsoft.com/office/drawing/2014/main" id="{F1D33E92-B004-274F-8D19-4725DA9AB871}"/>
+              </a:ext>
+            </a:extLst>
+          </p:cNvPr>
+          <p:cNvPicPr>
+            <a:picLocks noChangeAspect="1"/>
+          </p:cNvPicPr>
+          <p:nvPr/>
+        </p:nvPicPr>
+        <p:blipFill rotWithShape="1">
+          <a:blip r:embed="rId2"/>
+          <a:srcRect t="30583"/>
+          <a:stretch/>
+        </p:blipFill>
+        <p:spPr>
+          <a:xfrm>
+            <a:off x="4645418" y="1605215"/>
+            <a:ext cx="3240360" cy="4079618"/>
+          </a:xfrm>
+          <a:prstGeom prst="rect">
+            <a:avLst/>
+          </a:prstGeom>
+        </p:spPr>
+      </p:pic>
+    </p:spTree>
+    <p:extLst>
+      <p:ext uri="{BB962C8B-B14F-4D97-AF65-F5344CB8AC3E}">
+        <p14:creationId xmlns:p14="http://schemas.microsoft.com/office/powerpoint/2010/main" val="1702910739"/>
+      </p:ext>
+    </p:extLst>
+  </p:cSld>
+  <p:clrMapOvr>
+    <a:masterClrMapping/>
+  </p:clrMapOvr>
+</p:sld>
+</file>
+
+<file path=ppt/slides/slide11.xml><?xml version="1.0" encoding="utf-8"?>
+<p:sld xmlns:a="http://schemas.openxmlformats.org/drawingml/2006/main" xmlns:r="http://schemas.openxmlformats.org/officeDocument/2006/relationships" xmlns:p="http://schemas.openxmlformats.org/presentationml/2006/main">
+  <p:cSld>
+    <p:spTree>
+      <p:nvGrpSpPr>
+        <p:cNvPr id="1" name=""/>
+        <p:cNvGrpSpPr/>
+        <p:nvPr/>
+      </p:nvGrpSpPr>
+      <p:grpSpPr>
+        <a:xfrm>
+          <a:off x="0" y="0"/>
+          <a:ext cx="0" cy="0"/>
+          <a:chOff x="0" y="0"/>
+          <a:chExt cx="0" cy="0"/>
+        </a:xfrm>
+      </p:grpSpPr>
+      <p:sp>
+        <p:nvSpPr>
+          <p:cNvPr id="3" name="Content Placeholder 2"/>
+          <p:cNvSpPr>
+            <a:spLocks noGrp="1"/>
+          </p:cNvSpPr>
+          <p:nvPr>
+            <p:ph idx="1"/>
+          </p:nvPr>
+        </p:nvSpPr>
+        <p:spPr>
+          <a:xfrm>
+            <a:off x="457200" y="548680"/>
+            <a:ext cx="8229600" cy="6192688"/>
+          </a:xfrm>
+        </p:spPr>
+        <p:txBody>
+          <a:bodyPr>
+            <a:normAutofit/>
+          </a:bodyPr>
+          <a:lstStyle/>
+          <a:p>
+            <a:endParaRPr lang="en-GB" dirty="0"/>
+          </a:p>
+          <a:p>
+            <a:endParaRPr lang="en-GB" dirty="0"/>
+          </a:p>
+          <a:p>
+            <a:endParaRPr lang="en-GB" dirty="0"/>
+          </a:p>
+          <a:p>
+            <a:endParaRPr lang="en-GB" dirty="0"/>
+          </a:p>
+          <a:p>
+            <a:r>
+              <a:rPr lang="en-GB" dirty="0"/>
+              <a:t>Questions</a:t>
+            </a:r>
+          </a:p>
+          <a:p>
+            <a:pPr lvl="1"/>
+            <a:endParaRPr lang="en-GB" dirty="0"/>
+          </a:p>
+          <a:p>
+            <a:pPr lvl="1"/>
+            <a:endParaRPr lang="en-GB" dirty="0"/>
+          </a:p>
+        </p:txBody>
+      </p:sp>
+    </p:spTree>
+    <p:extLst>
+      <p:ext uri="{BB962C8B-B14F-4D97-AF65-F5344CB8AC3E}">
+        <p14:creationId xmlns:p14="http://schemas.microsoft.com/office/powerpoint/2010/main" val="3909483698"/>
+      </p:ext>
+    </p:extLst>
   </p:cSld>
   <p:clrMapOvr>
     <a:masterClrMapping/>
@@ -4928,26 +5112,17 @@
           </a:bodyPr>
           <a:lstStyle/>
           <a:p>
-            <a:endParaRPr lang="en-GB" dirty="0"/>
-          </a:p>
-          <a:p>
-            <a:endParaRPr lang="en-GB" dirty="0"/>
-          </a:p>
-          <a:p>
-            <a:endParaRPr lang="en-GB" dirty="0"/>
-          </a:p>
-          <a:p>
-            <a:endParaRPr lang="en-GB" dirty="0"/>
-          </a:p>
-          <a:p>
             <a:r>
               <a:rPr lang="en-GB" dirty="0"/>
-              <a:t>Questions</a:t>
+              <a:t>Introduction to the module</a:t>
             </a:r>
           </a:p>
           <a:p>
             <a:pPr lvl="1"/>
-            <a:endParaRPr lang="en-GB" dirty="0"/>
+            <a:r>
+              <a:rPr lang="en-GB" dirty="0"/>
+              <a:t>Everything isn’t different!</a:t>
+            </a:r>
           </a:p>
           <a:p>
             <a:pPr lvl="1"/>
@@ -4956,6 +5131,3211 @@
         </p:txBody>
       </p:sp>
     </p:spTree>
+    <p:extLst>
+      <p:ext uri="{BB962C8B-B14F-4D97-AF65-F5344CB8AC3E}">
+        <p14:creationId xmlns:p14="http://schemas.microsoft.com/office/powerpoint/2010/main" val="1295366226"/>
+      </p:ext>
+    </p:extLst>
+  </p:cSld>
+  <p:clrMapOvr>
+    <a:masterClrMapping/>
+  </p:clrMapOvr>
+</p:sld>
+</file>
+
+<file path=ppt/slides/slide3.xml><?xml version="1.0" encoding="utf-8"?>
+<p:sld xmlns:a="http://schemas.openxmlformats.org/drawingml/2006/main" xmlns:r="http://schemas.openxmlformats.org/officeDocument/2006/relationships" xmlns:p="http://schemas.openxmlformats.org/presentationml/2006/main">
+  <p:cSld>
+    <p:spTree>
+      <p:nvGrpSpPr>
+        <p:cNvPr id="1" name=""/>
+        <p:cNvGrpSpPr/>
+        <p:nvPr/>
+      </p:nvGrpSpPr>
+      <p:grpSpPr>
+        <a:xfrm>
+          <a:off x="0" y="0"/>
+          <a:ext cx="0" cy="0"/>
+          <a:chOff x="0" y="0"/>
+          <a:chExt cx="0" cy="0"/>
+        </a:xfrm>
+      </p:grpSpPr>
+      <p:sp>
+        <p:nvSpPr>
+          <p:cNvPr id="3" name="Content Placeholder 2"/>
+          <p:cNvSpPr>
+            <a:spLocks noGrp="1"/>
+          </p:cNvSpPr>
+          <p:nvPr>
+            <p:ph idx="1"/>
+          </p:nvPr>
+        </p:nvSpPr>
+        <p:spPr>
+          <a:xfrm>
+            <a:off x="457200" y="548680"/>
+            <a:ext cx="8229600" cy="6192688"/>
+          </a:xfrm>
+        </p:spPr>
+        <p:txBody>
+          <a:bodyPr>
+            <a:normAutofit/>
+          </a:bodyPr>
+          <a:lstStyle/>
+          <a:p>
+            <a:r>
+              <a:rPr lang="en-GB" dirty="0"/>
+              <a:t>Introduction to the module</a:t>
+            </a:r>
+          </a:p>
+          <a:p>
+            <a:pPr lvl="1"/>
+            <a:r>
+              <a:rPr lang="en-GB" dirty="0"/>
+              <a:t>Everything isn’t different!</a:t>
+            </a:r>
+          </a:p>
+          <a:p>
+            <a:pPr lvl="1"/>
+            <a:r>
+              <a:rPr lang="en-GB" dirty="0"/>
+              <a:t>Built on GAM320 from last year</a:t>
+            </a:r>
+          </a:p>
+          <a:p>
+            <a:pPr lvl="1"/>
+            <a:r>
+              <a:rPr lang="en-GB" dirty="0"/>
+              <a:t>Now with:</a:t>
+            </a:r>
+          </a:p>
+          <a:p>
+            <a:pPr lvl="2"/>
+            <a:r>
+              <a:rPr lang="en-GB" dirty="0"/>
+              <a:t>Product owners are now supervisors</a:t>
+            </a:r>
+          </a:p>
+          <a:p>
+            <a:pPr lvl="2"/>
+            <a:r>
+              <a:rPr lang="en-GB" dirty="0"/>
+              <a:t>Supervisor meetings are now 1hr30</a:t>
+            </a:r>
+          </a:p>
+          <a:p>
+            <a:pPr lvl="3"/>
+            <a:r>
+              <a:rPr lang="en-GB" dirty="0"/>
+              <a:t>More guided than before</a:t>
+            </a:r>
+          </a:p>
+          <a:p>
+            <a:pPr lvl="3"/>
+            <a:r>
+              <a:rPr lang="en-GB" dirty="0"/>
+              <a:t>One to review your builds &amp; sprint plans</a:t>
+            </a:r>
+          </a:p>
+          <a:p>
+            <a:pPr lvl="3"/>
+            <a:r>
+              <a:rPr lang="en-GB" dirty="0"/>
+              <a:t>One to do peer reviews</a:t>
+            </a:r>
+          </a:p>
+          <a:p>
+            <a:pPr lvl="2"/>
+            <a:r>
+              <a:rPr lang="en-GB" dirty="0"/>
+              <a:t>New Project Management Tool</a:t>
+            </a:r>
+          </a:p>
+          <a:p>
+            <a:pPr lvl="3"/>
+            <a:r>
+              <a:rPr lang="en-GB" dirty="0"/>
+              <a:t>Replacing </a:t>
+            </a:r>
+            <a:r>
+              <a:rPr lang="en-GB" dirty="0" err="1"/>
+              <a:t>pomeetings</a:t>
+            </a:r>
+            <a:endParaRPr lang="en-GB" dirty="0"/>
+          </a:p>
+          <a:p>
+            <a:pPr lvl="2"/>
+            <a:r>
+              <a:rPr lang="en-GB" dirty="0"/>
+              <a:t>Assignments are clearer</a:t>
+            </a:r>
+          </a:p>
+          <a:p>
+            <a:pPr lvl="3"/>
+            <a:r>
+              <a:rPr lang="en-GB" dirty="0"/>
+              <a:t>With added rubrics</a:t>
+            </a:r>
+          </a:p>
+          <a:p>
+            <a:pPr lvl="2"/>
+            <a:endParaRPr lang="en-GB" dirty="0"/>
+          </a:p>
+          <a:p>
+            <a:pPr lvl="1"/>
+            <a:endParaRPr lang="en-GB" dirty="0"/>
+          </a:p>
+        </p:txBody>
+      </p:sp>
+    </p:spTree>
+    <p:extLst>
+      <p:ext uri="{BB962C8B-B14F-4D97-AF65-F5344CB8AC3E}">
+        <p14:creationId xmlns:p14="http://schemas.microsoft.com/office/powerpoint/2010/main" val="2066616848"/>
+      </p:ext>
+    </p:extLst>
+  </p:cSld>
+  <p:clrMapOvr>
+    <a:masterClrMapping/>
+  </p:clrMapOvr>
+</p:sld>
+</file>
+
+<file path=ppt/slides/slide4.xml><?xml version="1.0" encoding="utf-8"?>
+<p:sld xmlns:a="http://schemas.openxmlformats.org/drawingml/2006/main" xmlns:r="http://schemas.openxmlformats.org/officeDocument/2006/relationships" xmlns:p="http://schemas.openxmlformats.org/presentationml/2006/main">
+  <p:cSld>
+    <p:spTree>
+      <p:nvGrpSpPr>
+        <p:cNvPr id="1" name=""/>
+        <p:cNvGrpSpPr/>
+        <p:nvPr/>
+      </p:nvGrpSpPr>
+      <p:grpSpPr>
+        <a:xfrm>
+          <a:off x="0" y="0"/>
+          <a:ext cx="0" cy="0"/>
+          <a:chOff x="0" y="0"/>
+          <a:chExt cx="0" cy="0"/>
+        </a:xfrm>
+      </p:grpSpPr>
+      <p:sp>
+        <p:nvSpPr>
+          <p:cNvPr id="3" name="Content Placeholder 2"/>
+          <p:cNvSpPr>
+            <a:spLocks noGrp="1"/>
+          </p:cNvSpPr>
+          <p:nvPr>
+            <p:ph idx="1"/>
+          </p:nvPr>
+        </p:nvSpPr>
+        <p:spPr>
+          <a:xfrm>
+            <a:off x="457200" y="548680"/>
+            <a:ext cx="8229600" cy="6192688"/>
+          </a:xfrm>
+        </p:spPr>
+        <p:txBody>
+          <a:bodyPr>
+            <a:normAutofit/>
+          </a:bodyPr>
+          <a:lstStyle/>
+          <a:p>
+            <a:r>
+              <a:rPr lang="en-GB" dirty="0"/>
+              <a:t>Introduction to the module</a:t>
+            </a:r>
+          </a:p>
+          <a:p>
+            <a:pPr lvl="1"/>
+            <a:r>
+              <a:rPr lang="en-GB" dirty="0"/>
+              <a:t>Now with:</a:t>
+            </a:r>
+          </a:p>
+          <a:p>
+            <a:pPr lvl="2"/>
+            <a:r>
+              <a:rPr lang="en-GB" dirty="0"/>
+              <a:t>Assignments are clearer</a:t>
+            </a:r>
+          </a:p>
+          <a:p>
+            <a:pPr lvl="3"/>
+            <a:r>
+              <a:rPr lang="en-GB" dirty="0"/>
+              <a:t>With added rubrics</a:t>
+            </a:r>
+          </a:p>
+          <a:p>
+            <a:pPr lvl="2"/>
+            <a:r>
+              <a:rPr lang="en-GB" dirty="0">
+                <a:hlinkClick r:id="rId2"/>
+              </a:rPr>
+              <a:t>https://learningspace.falmouth.ac.uk/course/view.php?id=3976</a:t>
+            </a:r>
+            <a:endParaRPr lang="en-GB" dirty="0"/>
+          </a:p>
+          <a:p>
+            <a:pPr lvl="2"/>
+            <a:endParaRPr lang="en-GB" dirty="0"/>
+          </a:p>
+          <a:p>
+            <a:pPr lvl="1"/>
+            <a:endParaRPr lang="en-GB" dirty="0"/>
+          </a:p>
+        </p:txBody>
+      </p:sp>
+    </p:spTree>
+    <p:extLst>
+      <p:ext uri="{BB962C8B-B14F-4D97-AF65-F5344CB8AC3E}">
+        <p14:creationId xmlns:p14="http://schemas.microsoft.com/office/powerpoint/2010/main" val="1353741948"/>
+      </p:ext>
+    </p:extLst>
+  </p:cSld>
+  <p:clrMapOvr>
+    <a:masterClrMapping/>
+  </p:clrMapOvr>
+</p:sld>
+</file>
+
+<file path=ppt/slides/slide5.xml><?xml version="1.0" encoding="utf-8"?>
+<p:sld xmlns:a="http://schemas.openxmlformats.org/drawingml/2006/main" xmlns:r="http://schemas.openxmlformats.org/officeDocument/2006/relationships" xmlns:p="http://schemas.openxmlformats.org/presentationml/2006/main">
+  <p:cSld>
+    <p:spTree>
+      <p:nvGrpSpPr>
+        <p:cNvPr id="1" name=""/>
+        <p:cNvGrpSpPr/>
+        <p:nvPr/>
+      </p:nvGrpSpPr>
+      <p:grpSpPr>
+        <a:xfrm>
+          <a:off x="0" y="0"/>
+          <a:ext cx="0" cy="0"/>
+          <a:chOff x="0" y="0"/>
+          <a:chExt cx="0" cy="0"/>
+        </a:xfrm>
+      </p:grpSpPr>
+      <p:sp>
+        <p:nvSpPr>
+          <p:cNvPr id="3" name="Content Placeholder 2"/>
+          <p:cNvSpPr>
+            <a:spLocks noGrp="1"/>
+          </p:cNvSpPr>
+          <p:nvPr>
+            <p:ph idx="1"/>
+          </p:nvPr>
+        </p:nvSpPr>
+        <p:spPr>
+          <a:xfrm>
+            <a:off x="457200" y="548680"/>
+            <a:ext cx="8229600" cy="6192688"/>
+          </a:xfrm>
+        </p:spPr>
+        <p:txBody>
+          <a:bodyPr>
+            <a:normAutofit/>
+          </a:bodyPr>
+          <a:lstStyle/>
+          <a:p>
+            <a:r>
+              <a:rPr lang="en-GB" dirty="0"/>
+              <a:t>Introduction to the module</a:t>
+            </a:r>
+          </a:p>
+          <a:p>
+            <a:pPr lvl="1"/>
+            <a:r>
+              <a:rPr lang="en-GB" dirty="0"/>
+              <a:t>Assignment 1: Studio practice</a:t>
+            </a:r>
+          </a:p>
+          <a:p>
+            <a:pPr lvl="2"/>
+            <a:r>
+              <a:rPr lang="en-GB" dirty="0"/>
+              <a:t>Assess how you work as a member of an agile team</a:t>
+            </a:r>
+          </a:p>
+          <a:p>
+            <a:pPr lvl="2"/>
+            <a:r>
+              <a:rPr lang="en-GB" dirty="0"/>
+              <a:t>Assess your game product</a:t>
+            </a:r>
+          </a:p>
+          <a:p>
+            <a:pPr lvl="3"/>
+            <a:r>
+              <a:rPr lang="en-GB" dirty="0"/>
+              <a:t>Conceptual coherence</a:t>
+            </a:r>
+          </a:p>
+          <a:p>
+            <a:pPr lvl="3"/>
+            <a:r>
+              <a:rPr lang="en-GB" dirty="0"/>
+              <a:t>Innovation</a:t>
+            </a:r>
+          </a:p>
+          <a:p>
+            <a:pPr lvl="3"/>
+            <a:r>
+              <a:rPr lang="en-GB" dirty="0"/>
+              <a:t>quality </a:t>
+            </a:r>
+          </a:p>
+          <a:p>
+            <a:pPr lvl="3"/>
+            <a:r>
+              <a:rPr lang="en-GB" dirty="0"/>
+              <a:t>player engagement</a:t>
+            </a:r>
+          </a:p>
+          <a:p>
+            <a:pPr lvl="2"/>
+            <a:endParaRPr lang="en-GB" dirty="0"/>
+          </a:p>
+          <a:p>
+            <a:pPr lvl="2"/>
+            <a:r>
+              <a:rPr lang="en-GB" dirty="0"/>
+              <a:t>Assessed over the duration of semester 1</a:t>
+            </a:r>
+          </a:p>
+          <a:p>
+            <a:pPr lvl="2"/>
+            <a:r>
+              <a:rPr lang="en-GB" dirty="0"/>
+              <a:t>And for the demo day (week 13)</a:t>
+            </a:r>
+          </a:p>
+          <a:p>
+            <a:pPr lvl="3"/>
+            <a:endParaRPr lang="en-GB" dirty="0"/>
+          </a:p>
+        </p:txBody>
+      </p:sp>
+    </p:spTree>
+    <p:extLst>
+      <p:ext uri="{BB962C8B-B14F-4D97-AF65-F5344CB8AC3E}">
+        <p14:creationId xmlns:p14="http://schemas.microsoft.com/office/powerpoint/2010/main" val="3243117177"/>
+      </p:ext>
+    </p:extLst>
+  </p:cSld>
+  <p:clrMapOvr>
+    <a:masterClrMapping/>
+  </p:clrMapOvr>
+</p:sld>
+</file>
+
+<file path=ppt/slides/slide6.xml><?xml version="1.0" encoding="utf-8"?>
+<p:sld xmlns:a="http://schemas.openxmlformats.org/drawingml/2006/main" xmlns:r="http://schemas.openxmlformats.org/officeDocument/2006/relationships" xmlns:p="http://schemas.openxmlformats.org/presentationml/2006/main">
+  <p:cSld>
+    <p:spTree>
+      <p:nvGrpSpPr>
+        <p:cNvPr id="1" name=""/>
+        <p:cNvGrpSpPr/>
+        <p:nvPr/>
+      </p:nvGrpSpPr>
+      <p:grpSpPr>
+        <a:xfrm>
+          <a:off x="0" y="0"/>
+          <a:ext cx="0" cy="0"/>
+          <a:chOff x="0" y="0"/>
+          <a:chExt cx="0" cy="0"/>
+        </a:xfrm>
+      </p:grpSpPr>
+      <p:sp>
+        <p:nvSpPr>
+          <p:cNvPr id="3" name="Content Placeholder 2"/>
+          <p:cNvSpPr>
+            <a:spLocks noGrp="1"/>
+          </p:cNvSpPr>
+          <p:nvPr>
+            <p:ph idx="1"/>
+          </p:nvPr>
+        </p:nvSpPr>
+        <p:spPr>
+          <a:xfrm>
+            <a:off x="457200" y="548680"/>
+            <a:ext cx="8229600" cy="6192688"/>
+          </a:xfrm>
+        </p:spPr>
+        <p:txBody>
+          <a:bodyPr>
+            <a:normAutofit/>
+          </a:bodyPr>
+          <a:lstStyle/>
+          <a:p>
+            <a:r>
+              <a:rPr lang="en-GB" dirty="0"/>
+              <a:t>Introduction to the module</a:t>
+            </a:r>
+          </a:p>
+          <a:p>
+            <a:pPr lvl="1"/>
+            <a:r>
+              <a:rPr lang="en-GB" dirty="0"/>
+              <a:t>Assignment 2: Evaluation</a:t>
+            </a:r>
+          </a:p>
+          <a:p>
+            <a:pPr lvl="2"/>
+            <a:r>
+              <a:rPr lang="en-GB" dirty="0"/>
+              <a:t>Reflective practice report</a:t>
+            </a:r>
+          </a:p>
+          <a:p>
+            <a:pPr lvl="3"/>
+            <a:r>
+              <a:rPr lang="en-GB" dirty="0"/>
+              <a:t>Look back on what you have done</a:t>
+            </a:r>
+          </a:p>
+          <a:p>
+            <a:pPr lvl="3"/>
+            <a:r>
+              <a:rPr lang="en-GB" dirty="0"/>
+              <a:t>Look forward to the future with a SMART plan</a:t>
+            </a:r>
+          </a:p>
+          <a:p>
+            <a:pPr lvl="3"/>
+            <a:endParaRPr lang="en-GB" dirty="0"/>
+          </a:p>
+        </p:txBody>
+      </p:sp>
+    </p:spTree>
+    <p:extLst>
+      <p:ext uri="{BB962C8B-B14F-4D97-AF65-F5344CB8AC3E}">
+        <p14:creationId xmlns:p14="http://schemas.microsoft.com/office/powerpoint/2010/main" val="60925675"/>
+      </p:ext>
+    </p:extLst>
+  </p:cSld>
+  <p:clrMapOvr>
+    <a:masterClrMapping/>
+  </p:clrMapOvr>
+</p:sld>
+</file>
+
+<file path=ppt/slides/slide7.xml><?xml version="1.0" encoding="utf-8"?>
+<p:sld xmlns:a="http://schemas.openxmlformats.org/drawingml/2006/main" xmlns:r="http://schemas.openxmlformats.org/officeDocument/2006/relationships" xmlns:p="http://schemas.openxmlformats.org/presentationml/2006/main">
+  <p:cSld>
+    <p:spTree>
+      <p:nvGrpSpPr>
+        <p:cNvPr id="1" name=""/>
+        <p:cNvGrpSpPr/>
+        <p:nvPr/>
+      </p:nvGrpSpPr>
+      <p:grpSpPr>
+        <a:xfrm>
+          <a:off x="0" y="0"/>
+          <a:ext cx="0" cy="0"/>
+          <a:chOff x="0" y="0"/>
+          <a:chExt cx="0" cy="0"/>
+        </a:xfrm>
+      </p:grpSpPr>
+      <p:sp>
+        <p:nvSpPr>
+          <p:cNvPr id="3" name="Content Placeholder 2"/>
+          <p:cNvSpPr>
+            <a:spLocks noGrp="1"/>
+          </p:cNvSpPr>
+          <p:nvPr>
+            <p:ph idx="1"/>
+          </p:nvPr>
+        </p:nvSpPr>
+        <p:spPr>
+          <a:xfrm>
+            <a:off x="446856" y="548680"/>
+            <a:ext cx="8229600" cy="6120680"/>
+          </a:xfrm>
+        </p:spPr>
+        <p:txBody>
+          <a:bodyPr>
+            <a:normAutofit/>
+          </a:bodyPr>
+          <a:lstStyle/>
+          <a:p>
+            <a:r>
+              <a:rPr lang="en-GB" dirty="0"/>
+              <a:t>Introduction to the module</a:t>
+            </a:r>
+          </a:p>
+        </p:txBody>
+      </p:sp>
+      <p:sp>
+        <p:nvSpPr>
+          <p:cNvPr id="4" name="Content Placeholder 2"/>
+          <p:cNvSpPr txBox="1">
+            <a:spLocks/>
+          </p:cNvSpPr>
+          <p:nvPr/>
+        </p:nvSpPr>
+        <p:spPr>
+          <a:xfrm>
+            <a:off x="323528" y="1739949"/>
+            <a:ext cx="8229600" cy="5217443"/>
+          </a:xfrm>
+          <a:prstGeom prst="rect">
+            <a:avLst/>
+          </a:prstGeom>
+        </p:spPr>
+        <p:txBody>
+          <a:bodyPr vert="horz" lIns="91440" tIns="45720" rIns="91440" bIns="45720" rtlCol="0">
+            <a:normAutofit/>
+          </a:bodyPr>
+          <a:lstStyle/>
+          <a:p>
+            <a:pPr marL="742950" marR="0" lvl="1" indent="-285750" algn="l" defTabSz="914400" rtl="0" eaLnBrk="1" fontAlgn="auto" latinLnBrk="0" hangingPunct="1">
+              <a:lnSpc>
+                <a:spcPct val="100000"/>
+              </a:lnSpc>
+              <a:spcBef>
+                <a:spcPct val="20000"/>
+              </a:spcBef>
+              <a:spcAft>
+                <a:spcPts val="0"/>
+              </a:spcAft>
+              <a:buClrTx/>
+              <a:buSzTx/>
+              <a:buFont typeface="Arial" pitchFamily="34" charset="0"/>
+              <a:buChar char="–"/>
+              <a:tabLst/>
+              <a:defRPr/>
+            </a:pPr>
+            <a:endParaRPr kumimoji="0" lang="en-GB" sz="2800" b="0" i="0" u="none" strike="noStrike" kern="1200" cap="none" spc="0" normalizeH="0" baseline="0" noProof="0" dirty="0">
+              <a:ln>
+                <a:noFill/>
+              </a:ln>
+              <a:solidFill>
+                <a:schemeClr val="bg1"/>
+              </a:solidFill>
+              <a:effectLst/>
+              <a:uLnTx/>
+              <a:uFillTx/>
+              <a:latin typeface="+mn-lt"/>
+              <a:ea typeface="+mn-ea"/>
+              <a:cs typeface="+mn-cs"/>
+            </a:endParaRPr>
+          </a:p>
+          <a:p>
+            <a:pPr marL="742950" marR="0" lvl="1" indent="-285750" algn="l" defTabSz="914400" rtl="0" eaLnBrk="1" fontAlgn="auto" latinLnBrk="0" hangingPunct="1">
+              <a:lnSpc>
+                <a:spcPct val="100000"/>
+              </a:lnSpc>
+              <a:spcBef>
+                <a:spcPct val="20000"/>
+              </a:spcBef>
+              <a:spcAft>
+                <a:spcPts val="0"/>
+              </a:spcAft>
+              <a:buClrTx/>
+              <a:buSzTx/>
+              <a:buFont typeface="Arial" pitchFamily="34" charset="0"/>
+              <a:buChar char="–"/>
+              <a:tabLst/>
+              <a:defRPr/>
+            </a:pPr>
+            <a:endParaRPr kumimoji="0" lang="en-GB" sz="2800" b="0" i="0" u="none" strike="noStrike" kern="1200" cap="none" spc="0" normalizeH="0" baseline="0" noProof="0" dirty="0">
+              <a:ln>
+                <a:noFill/>
+              </a:ln>
+              <a:solidFill>
+                <a:schemeClr val="bg1"/>
+              </a:solidFill>
+              <a:effectLst/>
+              <a:uLnTx/>
+              <a:uFillTx/>
+              <a:latin typeface="+mn-lt"/>
+              <a:ea typeface="+mn-ea"/>
+              <a:cs typeface="+mn-cs"/>
+            </a:endParaRPr>
+          </a:p>
+          <a:p>
+            <a:pPr marL="742950" marR="0" lvl="1" indent="-285750" algn="l" defTabSz="914400" rtl="0" eaLnBrk="1" fontAlgn="auto" latinLnBrk="0" hangingPunct="1">
+              <a:lnSpc>
+                <a:spcPct val="100000"/>
+              </a:lnSpc>
+              <a:spcBef>
+                <a:spcPct val="20000"/>
+              </a:spcBef>
+              <a:spcAft>
+                <a:spcPts val="0"/>
+              </a:spcAft>
+              <a:buClrTx/>
+              <a:buSzTx/>
+              <a:buFont typeface="Arial" pitchFamily="34" charset="0"/>
+              <a:buChar char="–"/>
+              <a:tabLst/>
+              <a:defRPr/>
+            </a:pPr>
+            <a:endParaRPr kumimoji="0" lang="en-GB" sz="2800" b="0" i="0" u="none" strike="noStrike" kern="1200" cap="none" spc="0" normalizeH="0" baseline="0" noProof="0" dirty="0">
+              <a:ln>
+                <a:noFill/>
+              </a:ln>
+              <a:solidFill>
+                <a:schemeClr val="bg1"/>
+              </a:solidFill>
+              <a:effectLst/>
+              <a:uLnTx/>
+              <a:uFillTx/>
+              <a:latin typeface="+mn-lt"/>
+              <a:ea typeface="+mn-ea"/>
+              <a:cs typeface="+mn-cs"/>
+            </a:endParaRPr>
+          </a:p>
+        </p:txBody>
+      </p:sp>
+      <p:graphicFrame>
+        <p:nvGraphicFramePr>
+          <p:cNvPr id="6" name="Content Placeholder 3"/>
+          <p:cNvGraphicFramePr>
+            <a:graphicFrameLocks/>
+          </p:cNvGraphicFramePr>
+          <p:nvPr>
+            <p:extLst>
+              <p:ext uri="{D42A27DB-BD31-4B8C-83A1-F6EECF244321}">
+                <p14:modId xmlns:p14="http://schemas.microsoft.com/office/powerpoint/2010/main" val="3438556053"/>
+              </p:ext>
+            </p:extLst>
+          </p:nvPr>
+        </p:nvGraphicFramePr>
+        <p:xfrm>
+          <a:off x="467544" y="1484784"/>
+          <a:ext cx="8208912" cy="1676400"/>
+        </p:xfrm>
+        <a:graphic>
+          <a:graphicData uri="http://schemas.openxmlformats.org/drawingml/2006/table">
+            <a:tbl>
+              <a:tblPr firstRow="1" bandRow="1">
+                <a:tableStyleId>{5C22544A-7EE6-4342-B048-85BDC9FD1C3A}</a:tableStyleId>
+              </a:tblPr>
+              <a:tblGrid>
+                <a:gridCol w="1368152">
+                  <a:extLst>
+                    <a:ext uri="{9D8B030D-6E8A-4147-A177-3AD203B41FA5}">
+                      <a16:colId xmlns:a16="http://schemas.microsoft.com/office/drawing/2014/main" val="20000"/>
+                    </a:ext>
+                  </a:extLst>
+                </a:gridCol>
+                <a:gridCol w="1368152">
+                  <a:extLst>
+                    <a:ext uri="{9D8B030D-6E8A-4147-A177-3AD203B41FA5}">
+                      <a16:colId xmlns:a16="http://schemas.microsoft.com/office/drawing/2014/main" val="20001"/>
+                    </a:ext>
+                  </a:extLst>
+                </a:gridCol>
+                <a:gridCol w="1368152">
+                  <a:extLst>
+                    <a:ext uri="{9D8B030D-6E8A-4147-A177-3AD203B41FA5}">
+                      <a16:colId xmlns:a16="http://schemas.microsoft.com/office/drawing/2014/main" val="20002"/>
+                    </a:ext>
+                  </a:extLst>
+                </a:gridCol>
+                <a:gridCol w="1368152">
+                  <a:extLst>
+                    <a:ext uri="{9D8B030D-6E8A-4147-A177-3AD203B41FA5}">
+                      <a16:colId xmlns:a16="http://schemas.microsoft.com/office/drawing/2014/main" val="20003"/>
+                    </a:ext>
+                  </a:extLst>
+                </a:gridCol>
+                <a:gridCol w="1368152">
+                  <a:extLst>
+                    <a:ext uri="{9D8B030D-6E8A-4147-A177-3AD203B41FA5}">
+                      <a16:colId xmlns:a16="http://schemas.microsoft.com/office/drawing/2014/main" val="20004"/>
+                    </a:ext>
+                  </a:extLst>
+                </a:gridCol>
+                <a:gridCol w="1368152">
+                  <a:extLst>
+                    <a:ext uri="{9D8B030D-6E8A-4147-A177-3AD203B41FA5}">
+                      <a16:colId xmlns:a16="http://schemas.microsoft.com/office/drawing/2014/main" val="20005"/>
+                    </a:ext>
+                  </a:extLst>
+                </a:gridCol>
+              </a:tblGrid>
+              <a:tr h="370840">
+                <a:tc>
+                  <a:txBody>
+                    <a:bodyPr/>
+                    <a:lstStyle/>
+                    <a:p>
+                      <a:pPr algn="ctr"/>
+                      <a:r>
+                        <a:rPr lang="en-GB" dirty="0"/>
+                        <a:t>Week 1</a:t>
+                      </a:r>
+                    </a:p>
+                  </a:txBody>
+                  <a:tcPr/>
+                </a:tc>
+                <a:tc>
+                  <a:txBody>
+                    <a:bodyPr/>
+                    <a:lstStyle/>
+                    <a:p>
+                      <a:pPr algn="ctr"/>
+                      <a:r>
+                        <a:rPr lang="en-GB" dirty="0"/>
+                        <a:t>Week</a:t>
+                      </a:r>
+                      <a:r>
+                        <a:rPr lang="en-GB" baseline="0" dirty="0"/>
+                        <a:t> 2</a:t>
+                      </a:r>
+                      <a:endParaRPr lang="en-GB" dirty="0"/>
+                    </a:p>
+                  </a:txBody>
+                  <a:tcPr/>
+                </a:tc>
+                <a:tc>
+                  <a:txBody>
+                    <a:bodyPr/>
+                    <a:lstStyle/>
+                    <a:p>
+                      <a:pPr algn="ctr"/>
+                      <a:r>
+                        <a:rPr lang="en-GB" dirty="0"/>
+                        <a:t>Week 3</a:t>
+                      </a:r>
+                    </a:p>
+                  </a:txBody>
+                  <a:tcPr/>
+                </a:tc>
+                <a:tc>
+                  <a:txBody>
+                    <a:bodyPr/>
+                    <a:lstStyle/>
+                    <a:p>
+                      <a:pPr algn="ctr"/>
+                      <a:r>
+                        <a:rPr lang="en-GB" dirty="0"/>
+                        <a:t>Week 4</a:t>
+                      </a:r>
+                    </a:p>
+                  </a:txBody>
+                  <a:tcPr/>
+                </a:tc>
+                <a:tc>
+                  <a:txBody>
+                    <a:bodyPr/>
+                    <a:lstStyle/>
+                    <a:p>
+                      <a:pPr algn="ctr"/>
+                      <a:r>
+                        <a:rPr lang="en-GB" dirty="0"/>
+                        <a:t>Week 5</a:t>
+                      </a:r>
+                    </a:p>
+                  </a:txBody>
+                  <a:tcPr/>
+                </a:tc>
+                <a:tc>
+                  <a:txBody>
+                    <a:bodyPr/>
+                    <a:lstStyle/>
+                    <a:p>
+                      <a:pPr algn="ctr"/>
+                      <a:r>
+                        <a:rPr lang="en-GB" dirty="0"/>
+                        <a:t>Reading Week</a:t>
+                      </a:r>
+                    </a:p>
+                  </a:txBody>
+                  <a:tcPr/>
+                </a:tc>
+                <a:extLst>
+                  <a:ext uri="{0D108BD9-81ED-4DB2-BD59-A6C34878D82A}">
+                    <a16:rowId xmlns:a16="http://schemas.microsoft.com/office/drawing/2014/main" val="10000"/>
+                  </a:ext>
+                </a:extLst>
+              </a:tr>
+              <a:tr h="370840">
+                <a:tc>
+                  <a:txBody>
+                    <a:bodyPr/>
+                    <a:lstStyle/>
+                    <a:p>
+                      <a:pPr marL="0" marR="0" indent="0" algn="ctr" defTabSz="914400" rtl="0" eaLnBrk="1" fontAlgn="auto" latinLnBrk="0" hangingPunct="1">
+                        <a:lnSpc>
+                          <a:spcPct val="100000"/>
+                        </a:lnSpc>
+                        <a:spcBef>
+                          <a:spcPts val="0"/>
+                        </a:spcBef>
+                        <a:spcAft>
+                          <a:spcPts val="0"/>
+                        </a:spcAft>
+                        <a:buClrTx/>
+                        <a:buSzTx/>
+                        <a:buFontTx/>
+                        <a:buNone/>
+                        <a:tabLst/>
+                        <a:defRPr/>
+                      </a:pPr>
+                      <a:r>
+                        <a:rPr lang="en-GB" sz="1400" dirty="0"/>
+                        <a:t>Introduction</a:t>
+                      </a:r>
+                    </a:p>
+                  </a:txBody>
+                  <a:tcPr anchor="ctr">
+                    <a:solidFill>
+                      <a:schemeClr val="accent2"/>
+                    </a:solidFill>
+                  </a:tcPr>
+                </a:tc>
+                <a:tc>
+                  <a:txBody>
+                    <a:bodyPr/>
+                    <a:lstStyle/>
+                    <a:p>
+                      <a:pPr algn="ctr"/>
+                      <a:r>
+                        <a:rPr lang="en-GB" sz="1400" dirty="0"/>
+                        <a:t>Support </a:t>
+                      </a:r>
+                    </a:p>
+                    <a:p>
+                      <a:pPr algn="ctr"/>
+                      <a:r>
+                        <a:rPr lang="en-GB" sz="1400" dirty="0"/>
+                        <a:t>Lecture</a:t>
+                      </a:r>
+                    </a:p>
+                  </a:txBody>
+                  <a:tcPr anchor="ctr">
+                    <a:solidFill>
+                      <a:schemeClr val="accent2"/>
+                    </a:solidFill>
+                  </a:tcPr>
+                </a:tc>
+                <a:tc>
+                  <a:txBody>
+                    <a:bodyPr/>
+                    <a:lstStyle/>
+                    <a:p>
+                      <a:pPr marL="0" marR="0" lvl="0" indent="0" algn="ctr" defTabSz="914400" rtl="0" eaLnBrk="1" fontAlgn="auto" latinLnBrk="0" hangingPunct="1">
+                        <a:lnSpc>
+                          <a:spcPct val="100000"/>
+                        </a:lnSpc>
+                        <a:spcBef>
+                          <a:spcPts val="0"/>
+                        </a:spcBef>
+                        <a:spcAft>
+                          <a:spcPts val="0"/>
+                        </a:spcAft>
+                        <a:buClrTx/>
+                        <a:buSzTx/>
+                        <a:buFontTx/>
+                        <a:buNone/>
+                        <a:tabLst/>
+                        <a:defRPr/>
+                      </a:pPr>
+                      <a:r>
+                        <a:rPr kumimoji="0" lang="en-GB" sz="1400" b="0" i="0" u="none" strike="noStrike" kern="1200" cap="none" spc="0" normalizeH="0" baseline="0" noProof="0">
+                          <a:ln>
+                            <a:noFill/>
+                          </a:ln>
+                          <a:solidFill>
+                            <a:prstClr val="black"/>
+                          </a:solidFill>
+                          <a:effectLst/>
+                          <a:uLnTx/>
+                          <a:uFillTx/>
+                          <a:latin typeface="Calibri"/>
+                          <a:ea typeface="+mn-ea"/>
+                          <a:cs typeface="+mn-cs"/>
+                        </a:rPr>
+                        <a:t>Support </a:t>
+                      </a:r>
+                    </a:p>
+                    <a:p>
+                      <a:pPr marL="0" marR="0" lvl="0" indent="0" algn="ctr" defTabSz="914400" rtl="0" eaLnBrk="1" fontAlgn="auto" latinLnBrk="0" hangingPunct="1">
+                        <a:lnSpc>
+                          <a:spcPct val="100000"/>
+                        </a:lnSpc>
+                        <a:spcBef>
+                          <a:spcPts val="0"/>
+                        </a:spcBef>
+                        <a:spcAft>
+                          <a:spcPts val="0"/>
+                        </a:spcAft>
+                        <a:buClrTx/>
+                        <a:buSzTx/>
+                        <a:buFontTx/>
+                        <a:buNone/>
+                        <a:tabLst/>
+                        <a:defRPr/>
+                      </a:pPr>
+                      <a:r>
+                        <a:rPr kumimoji="0" lang="en-GB" sz="1400" b="0" i="0" u="none" strike="noStrike" kern="1200" cap="none" spc="0" normalizeH="0" baseline="0" noProof="0">
+                          <a:ln>
+                            <a:noFill/>
+                          </a:ln>
+                          <a:solidFill>
+                            <a:prstClr val="black"/>
+                          </a:solidFill>
+                          <a:effectLst/>
+                          <a:uLnTx/>
+                          <a:uFillTx/>
+                          <a:latin typeface="Calibri"/>
+                          <a:ea typeface="+mn-ea"/>
+                          <a:cs typeface="+mn-cs"/>
+                        </a:rPr>
+                        <a:t>Lecture</a:t>
+                      </a:r>
+                      <a:endParaRPr lang="en-GB" sz="1400" dirty="0"/>
+                    </a:p>
+                  </a:txBody>
+                  <a:tcPr anchor="ctr">
+                    <a:solidFill>
+                      <a:schemeClr val="accent2"/>
+                    </a:solidFill>
+                  </a:tcPr>
+                </a:tc>
+                <a:tc>
+                  <a:txBody>
+                    <a:bodyPr/>
+                    <a:lstStyle/>
+                    <a:p>
+                      <a:pPr marL="0" marR="0" lvl="0" indent="0" algn="ctr" defTabSz="914400" rtl="0" eaLnBrk="1" fontAlgn="auto" latinLnBrk="0" hangingPunct="1">
+                        <a:lnSpc>
+                          <a:spcPct val="100000"/>
+                        </a:lnSpc>
+                        <a:spcBef>
+                          <a:spcPts val="0"/>
+                        </a:spcBef>
+                        <a:spcAft>
+                          <a:spcPts val="0"/>
+                        </a:spcAft>
+                        <a:buClrTx/>
+                        <a:buSzTx/>
+                        <a:buFontTx/>
+                        <a:buNone/>
+                        <a:tabLst/>
+                        <a:defRPr/>
+                      </a:pPr>
+                      <a:r>
+                        <a:rPr kumimoji="0" lang="en-GB" sz="1400" b="0" i="0" u="none" strike="noStrike" kern="1200" cap="none" spc="0" normalizeH="0" baseline="0" noProof="0">
+                          <a:ln>
+                            <a:noFill/>
+                          </a:ln>
+                          <a:solidFill>
+                            <a:prstClr val="black"/>
+                          </a:solidFill>
+                          <a:effectLst/>
+                          <a:uLnTx/>
+                          <a:uFillTx/>
+                          <a:latin typeface="Calibri"/>
+                          <a:ea typeface="+mn-ea"/>
+                          <a:cs typeface="+mn-cs"/>
+                        </a:rPr>
+                        <a:t>Support </a:t>
+                      </a:r>
+                    </a:p>
+                    <a:p>
+                      <a:pPr marL="0" marR="0" lvl="0" indent="0" algn="ctr" defTabSz="914400" rtl="0" eaLnBrk="1" fontAlgn="auto" latinLnBrk="0" hangingPunct="1">
+                        <a:lnSpc>
+                          <a:spcPct val="100000"/>
+                        </a:lnSpc>
+                        <a:spcBef>
+                          <a:spcPts val="0"/>
+                        </a:spcBef>
+                        <a:spcAft>
+                          <a:spcPts val="0"/>
+                        </a:spcAft>
+                        <a:buClrTx/>
+                        <a:buSzTx/>
+                        <a:buFontTx/>
+                        <a:buNone/>
+                        <a:tabLst/>
+                        <a:defRPr/>
+                      </a:pPr>
+                      <a:r>
+                        <a:rPr kumimoji="0" lang="en-GB" sz="1400" b="0" i="0" u="none" strike="noStrike" kern="1200" cap="none" spc="0" normalizeH="0" baseline="0" noProof="0">
+                          <a:ln>
+                            <a:noFill/>
+                          </a:ln>
+                          <a:solidFill>
+                            <a:prstClr val="black"/>
+                          </a:solidFill>
+                          <a:effectLst/>
+                          <a:uLnTx/>
+                          <a:uFillTx/>
+                          <a:latin typeface="Calibri"/>
+                          <a:ea typeface="+mn-ea"/>
+                          <a:cs typeface="+mn-cs"/>
+                        </a:rPr>
+                        <a:t>Lecture</a:t>
+                      </a:r>
+                      <a:endParaRPr lang="en-GB" sz="1400" dirty="0"/>
+                    </a:p>
+                  </a:txBody>
+                  <a:tcPr anchor="ctr">
+                    <a:solidFill>
+                      <a:schemeClr val="accent2"/>
+                    </a:solidFill>
+                  </a:tcPr>
+                </a:tc>
+                <a:tc>
+                  <a:txBody>
+                    <a:bodyPr/>
+                    <a:lstStyle/>
+                    <a:p>
+                      <a:pPr marL="0" marR="0" lvl="0" indent="0" algn="ctr" defTabSz="914400" rtl="0" eaLnBrk="1" fontAlgn="auto" latinLnBrk="0" hangingPunct="1">
+                        <a:lnSpc>
+                          <a:spcPct val="100000"/>
+                        </a:lnSpc>
+                        <a:spcBef>
+                          <a:spcPts val="0"/>
+                        </a:spcBef>
+                        <a:spcAft>
+                          <a:spcPts val="0"/>
+                        </a:spcAft>
+                        <a:buClrTx/>
+                        <a:buSzTx/>
+                        <a:buFontTx/>
+                        <a:buNone/>
+                        <a:tabLst/>
+                        <a:defRPr/>
+                      </a:pPr>
+                      <a:r>
+                        <a:rPr kumimoji="0" lang="en-GB" sz="1400" b="0" i="0" u="none" strike="noStrike" kern="1200" cap="none" spc="0" normalizeH="0" baseline="0" noProof="0" dirty="0">
+                          <a:ln>
+                            <a:noFill/>
+                          </a:ln>
+                          <a:solidFill>
+                            <a:prstClr val="black"/>
+                          </a:solidFill>
+                          <a:effectLst/>
+                          <a:uLnTx/>
+                          <a:uFillTx/>
+                          <a:latin typeface="Calibri"/>
+                          <a:ea typeface="+mn-ea"/>
+                          <a:cs typeface="+mn-cs"/>
+                        </a:rPr>
+                        <a:t>Support </a:t>
+                      </a:r>
+                    </a:p>
+                    <a:p>
+                      <a:pPr marL="0" marR="0" lvl="0" indent="0" algn="ctr" defTabSz="914400" rtl="0" eaLnBrk="1" fontAlgn="auto" latinLnBrk="0" hangingPunct="1">
+                        <a:lnSpc>
+                          <a:spcPct val="100000"/>
+                        </a:lnSpc>
+                        <a:spcBef>
+                          <a:spcPts val="0"/>
+                        </a:spcBef>
+                        <a:spcAft>
+                          <a:spcPts val="0"/>
+                        </a:spcAft>
+                        <a:buClrTx/>
+                        <a:buSzTx/>
+                        <a:buFontTx/>
+                        <a:buNone/>
+                        <a:tabLst/>
+                        <a:defRPr/>
+                      </a:pPr>
+                      <a:r>
+                        <a:rPr kumimoji="0" lang="en-GB" sz="1400" b="0" i="0" u="none" strike="noStrike" kern="1200" cap="none" spc="0" normalizeH="0" baseline="0" noProof="0" dirty="0">
+                          <a:ln>
+                            <a:noFill/>
+                          </a:ln>
+                          <a:solidFill>
+                            <a:prstClr val="black"/>
+                          </a:solidFill>
+                          <a:effectLst/>
+                          <a:uLnTx/>
+                          <a:uFillTx/>
+                          <a:latin typeface="Calibri"/>
+                          <a:ea typeface="+mn-ea"/>
+                          <a:cs typeface="+mn-cs"/>
+                        </a:rPr>
+                        <a:t>Lecture</a:t>
+                      </a:r>
+                      <a:endParaRPr lang="en-GB" sz="1400" dirty="0"/>
+                    </a:p>
+                  </a:txBody>
+                  <a:tcPr anchor="ctr">
+                    <a:solidFill>
+                      <a:schemeClr val="accent2"/>
+                    </a:solidFill>
+                  </a:tcPr>
+                </a:tc>
+                <a:tc>
+                  <a:txBody>
+                    <a:bodyPr/>
+                    <a:lstStyle/>
+                    <a:p>
+                      <a:pPr algn="ctr"/>
+                      <a:endParaRPr lang="en-GB" sz="1400" dirty="0"/>
+                    </a:p>
+                  </a:txBody>
+                  <a:tcPr anchor="ctr">
+                    <a:solidFill>
+                      <a:schemeClr val="accent2"/>
+                    </a:solidFill>
+                  </a:tcPr>
+                </a:tc>
+                <a:extLst>
+                  <a:ext uri="{0D108BD9-81ED-4DB2-BD59-A6C34878D82A}">
+                    <a16:rowId xmlns:a16="http://schemas.microsoft.com/office/drawing/2014/main" val="10001"/>
+                  </a:ext>
+                </a:extLst>
+              </a:tr>
+              <a:tr h="370840">
+                <a:tc>
+                  <a:txBody>
+                    <a:bodyPr/>
+                    <a:lstStyle/>
+                    <a:p>
+                      <a:pPr marL="0" marR="0" indent="0" algn="ctr" defTabSz="914400" rtl="0" eaLnBrk="1" fontAlgn="auto" latinLnBrk="0" hangingPunct="1">
+                        <a:lnSpc>
+                          <a:spcPct val="100000"/>
+                        </a:lnSpc>
+                        <a:spcBef>
+                          <a:spcPts val="0"/>
+                        </a:spcBef>
+                        <a:spcAft>
+                          <a:spcPts val="0"/>
+                        </a:spcAft>
+                        <a:buClrTx/>
+                        <a:buSzTx/>
+                        <a:buFontTx/>
+                        <a:buNone/>
+                        <a:tabLst/>
+                        <a:defRPr/>
+                      </a:pPr>
+                      <a:r>
+                        <a:rPr lang="en-GB" sz="1400" dirty="0"/>
+                        <a:t>Supervisor</a:t>
+                      </a:r>
+                    </a:p>
+                    <a:p>
+                      <a:pPr marL="0" marR="0" indent="0" algn="ctr" defTabSz="914400" rtl="0" eaLnBrk="1" fontAlgn="auto" latinLnBrk="0" hangingPunct="1">
+                        <a:lnSpc>
+                          <a:spcPct val="100000"/>
+                        </a:lnSpc>
+                        <a:spcBef>
+                          <a:spcPts val="0"/>
+                        </a:spcBef>
+                        <a:spcAft>
+                          <a:spcPts val="0"/>
+                        </a:spcAft>
+                        <a:buClrTx/>
+                        <a:buSzTx/>
+                        <a:buFontTx/>
+                        <a:buNone/>
+                        <a:tabLst/>
+                        <a:defRPr/>
+                      </a:pPr>
+                      <a:r>
+                        <a:rPr lang="en-GB" sz="1400" dirty="0"/>
+                        <a:t>Meeting</a:t>
+                      </a:r>
+                    </a:p>
+                  </a:txBody>
+                  <a:tcPr anchor="ctr">
+                    <a:solidFill>
+                      <a:schemeClr val="accent3"/>
+                    </a:solidFill>
+                  </a:tcPr>
+                </a:tc>
+                <a:tc>
+                  <a:txBody>
+                    <a:bodyPr/>
+                    <a:lstStyle/>
+                    <a:p>
+                      <a:pPr marL="0" marR="0" lvl="0" indent="0" algn="ctr" defTabSz="914400" rtl="0" eaLnBrk="1" fontAlgn="auto" latinLnBrk="0" hangingPunct="1">
+                        <a:lnSpc>
+                          <a:spcPct val="100000"/>
+                        </a:lnSpc>
+                        <a:spcBef>
+                          <a:spcPts val="0"/>
+                        </a:spcBef>
+                        <a:spcAft>
+                          <a:spcPts val="0"/>
+                        </a:spcAft>
+                        <a:buClrTx/>
+                        <a:buSzTx/>
+                        <a:buFontTx/>
+                        <a:buNone/>
+                        <a:tabLst/>
+                        <a:defRPr/>
+                      </a:pPr>
+                      <a:r>
+                        <a:rPr kumimoji="0" lang="en-GB" sz="1400" b="0" i="0" u="none" strike="noStrike" kern="1200" cap="none" spc="0" normalizeH="0" baseline="0" noProof="0" dirty="0">
+                          <a:ln>
+                            <a:noFill/>
+                          </a:ln>
+                          <a:solidFill>
+                            <a:prstClr val="black"/>
+                          </a:solidFill>
+                          <a:effectLst/>
+                          <a:uLnTx/>
+                          <a:uFillTx/>
+                          <a:latin typeface="Calibri"/>
+                          <a:ea typeface="+mn-ea"/>
+                          <a:cs typeface="+mn-cs"/>
+                        </a:rPr>
+                        <a:t>Supervisor</a:t>
+                      </a:r>
+                    </a:p>
+                    <a:p>
+                      <a:pPr marL="0" marR="0" lvl="0" indent="0" algn="ctr" defTabSz="914400" rtl="0" eaLnBrk="1" fontAlgn="auto" latinLnBrk="0" hangingPunct="1">
+                        <a:lnSpc>
+                          <a:spcPct val="100000"/>
+                        </a:lnSpc>
+                        <a:spcBef>
+                          <a:spcPts val="0"/>
+                        </a:spcBef>
+                        <a:spcAft>
+                          <a:spcPts val="0"/>
+                        </a:spcAft>
+                        <a:buClrTx/>
+                        <a:buSzTx/>
+                        <a:buFontTx/>
+                        <a:buNone/>
+                        <a:tabLst/>
+                        <a:defRPr/>
+                      </a:pPr>
+                      <a:r>
+                        <a:rPr kumimoji="0" lang="en-GB" sz="1400" b="0" i="0" u="none" strike="noStrike" kern="1200" cap="none" spc="0" normalizeH="0" baseline="0" noProof="0" dirty="0">
+                          <a:ln>
+                            <a:noFill/>
+                          </a:ln>
+                          <a:solidFill>
+                            <a:prstClr val="black"/>
+                          </a:solidFill>
+                          <a:effectLst/>
+                          <a:uLnTx/>
+                          <a:uFillTx/>
+                          <a:latin typeface="Calibri"/>
+                          <a:ea typeface="+mn-ea"/>
+                          <a:cs typeface="+mn-cs"/>
+                        </a:rPr>
+                        <a:t>Meeting</a:t>
+                      </a:r>
+                    </a:p>
+                  </a:txBody>
+                  <a:tcPr anchor="ctr">
+                    <a:solidFill>
+                      <a:schemeClr val="accent3"/>
+                    </a:solidFill>
+                  </a:tcPr>
+                </a:tc>
+                <a:tc>
+                  <a:txBody>
+                    <a:bodyPr/>
+                    <a:lstStyle/>
+                    <a:p>
+                      <a:pPr marL="0" marR="0" lvl="0" indent="0" algn="ctr" defTabSz="914400" rtl="0" eaLnBrk="1" fontAlgn="auto" latinLnBrk="0" hangingPunct="1">
+                        <a:lnSpc>
+                          <a:spcPct val="100000"/>
+                        </a:lnSpc>
+                        <a:spcBef>
+                          <a:spcPts val="0"/>
+                        </a:spcBef>
+                        <a:spcAft>
+                          <a:spcPts val="0"/>
+                        </a:spcAft>
+                        <a:buClrTx/>
+                        <a:buSzTx/>
+                        <a:buFontTx/>
+                        <a:buNone/>
+                        <a:tabLst/>
+                        <a:defRPr/>
+                      </a:pPr>
+                      <a:r>
+                        <a:rPr kumimoji="0" lang="en-GB" sz="1400" b="0" i="0" u="none" strike="noStrike" kern="1200" cap="none" spc="0" normalizeH="0" baseline="0" noProof="0" dirty="0">
+                          <a:ln>
+                            <a:noFill/>
+                          </a:ln>
+                          <a:solidFill>
+                            <a:prstClr val="black"/>
+                          </a:solidFill>
+                          <a:effectLst/>
+                          <a:uLnTx/>
+                          <a:uFillTx/>
+                          <a:latin typeface="Calibri"/>
+                          <a:ea typeface="+mn-ea"/>
+                          <a:cs typeface="+mn-cs"/>
+                        </a:rPr>
+                        <a:t>Supervisor</a:t>
+                      </a:r>
+                    </a:p>
+                    <a:p>
+                      <a:pPr marL="0" marR="0" lvl="0" indent="0" algn="ctr" defTabSz="914400" rtl="0" eaLnBrk="1" fontAlgn="auto" latinLnBrk="0" hangingPunct="1">
+                        <a:lnSpc>
+                          <a:spcPct val="100000"/>
+                        </a:lnSpc>
+                        <a:spcBef>
+                          <a:spcPts val="0"/>
+                        </a:spcBef>
+                        <a:spcAft>
+                          <a:spcPts val="0"/>
+                        </a:spcAft>
+                        <a:buClrTx/>
+                        <a:buSzTx/>
+                        <a:buFontTx/>
+                        <a:buNone/>
+                        <a:tabLst/>
+                        <a:defRPr/>
+                      </a:pPr>
+                      <a:r>
+                        <a:rPr kumimoji="0" lang="en-GB" sz="1400" b="0" i="0" u="none" strike="noStrike" kern="1200" cap="none" spc="0" normalizeH="0" baseline="0" noProof="0" dirty="0">
+                          <a:ln>
+                            <a:noFill/>
+                          </a:ln>
+                          <a:solidFill>
+                            <a:prstClr val="black"/>
+                          </a:solidFill>
+                          <a:effectLst/>
+                          <a:uLnTx/>
+                          <a:uFillTx/>
+                          <a:latin typeface="Calibri"/>
+                          <a:ea typeface="+mn-ea"/>
+                          <a:cs typeface="+mn-cs"/>
+                        </a:rPr>
+                        <a:t>Meeting</a:t>
+                      </a:r>
+                    </a:p>
+                  </a:txBody>
+                  <a:tcPr anchor="ctr">
+                    <a:solidFill>
+                      <a:schemeClr val="accent3"/>
+                    </a:solidFill>
+                  </a:tcPr>
+                </a:tc>
+                <a:tc>
+                  <a:txBody>
+                    <a:bodyPr/>
+                    <a:lstStyle/>
+                    <a:p>
+                      <a:pPr marL="0" marR="0" lvl="0" indent="0" algn="ctr" defTabSz="914400" rtl="0" eaLnBrk="1" fontAlgn="auto" latinLnBrk="0" hangingPunct="1">
+                        <a:lnSpc>
+                          <a:spcPct val="100000"/>
+                        </a:lnSpc>
+                        <a:spcBef>
+                          <a:spcPts val="0"/>
+                        </a:spcBef>
+                        <a:spcAft>
+                          <a:spcPts val="0"/>
+                        </a:spcAft>
+                        <a:buClrTx/>
+                        <a:buSzTx/>
+                        <a:buFontTx/>
+                        <a:buNone/>
+                        <a:tabLst/>
+                        <a:defRPr/>
+                      </a:pPr>
+                      <a:r>
+                        <a:rPr kumimoji="0" lang="en-GB" sz="1400" b="0" i="0" u="none" strike="noStrike" kern="1200" cap="none" spc="0" normalizeH="0" baseline="0" noProof="0">
+                          <a:ln>
+                            <a:noFill/>
+                          </a:ln>
+                          <a:solidFill>
+                            <a:prstClr val="black"/>
+                          </a:solidFill>
+                          <a:effectLst/>
+                          <a:uLnTx/>
+                          <a:uFillTx/>
+                          <a:latin typeface="Calibri"/>
+                          <a:ea typeface="+mn-ea"/>
+                          <a:cs typeface="+mn-cs"/>
+                        </a:rPr>
+                        <a:t>Supervisor</a:t>
+                      </a:r>
+                    </a:p>
+                    <a:p>
+                      <a:pPr marL="0" marR="0" lvl="0" indent="0" algn="ctr" defTabSz="914400" rtl="0" eaLnBrk="1" fontAlgn="auto" latinLnBrk="0" hangingPunct="1">
+                        <a:lnSpc>
+                          <a:spcPct val="100000"/>
+                        </a:lnSpc>
+                        <a:spcBef>
+                          <a:spcPts val="0"/>
+                        </a:spcBef>
+                        <a:spcAft>
+                          <a:spcPts val="0"/>
+                        </a:spcAft>
+                        <a:buClrTx/>
+                        <a:buSzTx/>
+                        <a:buFontTx/>
+                        <a:buNone/>
+                        <a:tabLst/>
+                        <a:defRPr/>
+                      </a:pPr>
+                      <a:r>
+                        <a:rPr kumimoji="0" lang="en-GB" sz="1400" b="0" i="0" u="none" strike="noStrike" kern="1200" cap="none" spc="0" normalizeH="0" baseline="0" noProof="0">
+                          <a:ln>
+                            <a:noFill/>
+                          </a:ln>
+                          <a:solidFill>
+                            <a:prstClr val="black"/>
+                          </a:solidFill>
+                          <a:effectLst/>
+                          <a:uLnTx/>
+                          <a:uFillTx/>
+                          <a:latin typeface="Calibri"/>
+                          <a:ea typeface="+mn-ea"/>
+                          <a:cs typeface="+mn-cs"/>
+                        </a:rPr>
+                        <a:t>Meeting</a:t>
+                      </a:r>
+                      <a:endParaRPr kumimoji="0" lang="en-GB" sz="1400" b="0" i="0" u="none" strike="noStrike" kern="1200" cap="none" spc="0" normalizeH="0" baseline="0" noProof="0" dirty="0">
+                        <a:ln>
+                          <a:noFill/>
+                        </a:ln>
+                        <a:solidFill>
+                          <a:prstClr val="black"/>
+                        </a:solidFill>
+                        <a:effectLst/>
+                        <a:uLnTx/>
+                        <a:uFillTx/>
+                        <a:latin typeface="Calibri"/>
+                        <a:ea typeface="+mn-ea"/>
+                        <a:cs typeface="+mn-cs"/>
+                      </a:endParaRPr>
+                    </a:p>
+                  </a:txBody>
+                  <a:tcPr anchor="ctr">
+                    <a:solidFill>
+                      <a:schemeClr val="accent3"/>
+                    </a:solidFill>
+                  </a:tcPr>
+                </a:tc>
+                <a:tc>
+                  <a:txBody>
+                    <a:bodyPr/>
+                    <a:lstStyle/>
+                    <a:p>
+                      <a:pPr marL="0" marR="0" lvl="0" indent="0" algn="ctr" defTabSz="914400" rtl="0" eaLnBrk="1" fontAlgn="auto" latinLnBrk="0" hangingPunct="1">
+                        <a:lnSpc>
+                          <a:spcPct val="100000"/>
+                        </a:lnSpc>
+                        <a:spcBef>
+                          <a:spcPts val="0"/>
+                        </a:spcBef>
+                        <a:spcAft>
+                          <a:spcPts val="0"/>
+                        </a:spcAft>
+                        <a:buClrTx/>
+                        <a:buSzTx/>
+                        <a:buFontTx/>
+                        <a:buNone/>
+                        <a:tabLst/>
+                        <a:defRPr/>
+                      </a:pPr>
+                      <a:r>
+                        <a:rPr kumimoji="0" lang="en-GB" sz="1400" b="0" i="0" u="none" strike="noStrike" kern="1200" cap="none" spc="0" normalizeH="0" baseline="0" noProof="0" dirty="0">
+                          <a:ln>
+                            <a:noFill/>
+                          </a:ln>
+                          <a:solidFill>
+                            <a:prstClr val="black"/>
+                          </a:solidFill>
+                          <a:effectLst/>
+                          <a:uLnTx/>
+                          <a:uFillTx/>
+                          <a:latin typeface="Calibri"/>
+                          <a:ea typeface="+mn-ea"/>
+                          <a:cs typeface="+mn-cs"/>
+                        </a:rPr>
+                        <a:t>Supervisor</a:t>
+                      </a:r>
+                    </a:p>
+                    <a:p>
+                      <a:pPr marL="0" marR="0" lvl="0" indent="0" algn="ctr" defTabSz="914400" rtl="0" eaLnBrk="1" fontAlgn="auto" latinLnBrk="0" hangingPunct="1">
+                        <a:lnSpc>
+                          <a:spcPct val="100000"/>
+                        </a:lnSpc>
+                        <a:spcBef>
+                          <a:spcPts val="0"/>
+                        </a:spcBef>
+                        <a:spcAft>
+                          <a:spcPts val="0"/>
+                        </a:spcAft>
+                        <a:buClrTx/>
+                        <a:buSzTx/>
+                        <a:buFontTx/>
+                        <a:buNone/>
+                        <a:tabLst/>
+                        <a:defRPr/>
+                      </a:pPr>
+                      <a:r>
+                        <a:rPr kumimoji="0" lang="en-GB" sz="1400" b="0" i="0" u="none" strike="noStrike" kern="1200" cap="none" spc="0" normalizeH="0" baseline="0" noProof="0" dirty="0">
+                          <a:ln>
+                            <a:noFill/>
+                          </a:ln>
+                          <a:solidFill>
+                            <a:prstClr val="black"/>
+                          </a:solidFill>
+                          <a:effectLst/>
+                          <a:uLnTx/>
+                          <a:uFillTx/>
+                          <a:latin typeface="Calibri"/>
+                          <a:ea typeface="+mn-ea"/>
+                          <a:cs typeface="+mn-cs"/>
+                        </a:rPr>
+                        <a:t>Meeting</a:t>
+                      </a:r>
+                    </a:p>
+                  </a:txBody>
+                  <a:tcPr anchor="ctr">
+                    <a:solidFill>
+                      <a:schemeClr val="accent3"/>
+                    </a:solidFill>
+                  </a:tcPr>
+                </a:tc>
+                <a:tc>
+                  <a:txBody>
+                    <a:bodyPr/>
+                    <a:lstStyle/>
+                    <a:p>
+                      <a:pPr marL="0" marR="0" indent="0" algn="ctr" defTabSz="914400" rtl="0" eaLnBrk="1" fontAlgn="auto" latinLnBrk="0" hangingPunct="1">
+                        <a:lnSpc>
+                          <a:spcPct val="100000"/>
+                        </a:lnSpc>
+                        <a:spcBef>
+                          <a:spcPts val="0"/>
+                        </a:spcBef>
+                        <a:spcAft>
+                          <a:spcPts val="0"/>
+                        </a:spcAft>
+                        <a:buClrTx/>
+                        <a:buSzTx/>
+                        <a:buFontTx/>
+                        <a:buNone/>
+                        <a:tabLst/>
+                        <a:defRPr/>
+                      </a:pPr>
+                      <a:r>
+                        <a:rPr lang="en-GB" sz="1400" dirty="0"/>
+                        <a:t>Supervisor</a:t>
+                      </a:r>
+                    </a:p>
+                    <a:p>
+                      <a:pPr marL="0" marR="0" indent="0" algn="ctr" defTabSz="914400" rtl="0" eaLnBrk="1" fontAlgn="auto" latinLnBrk="0" hangingPunct="1">
+                        <a:lnSpc>
+                          <a:spcPct val="100000"/>
+                        </a:lnSpc>
+                        <a:spcBef>
+                          <a:spcPts val="0"/>
+                        </a:spcBef>
+                        <a:spcAft>
+                          <a:spcPts val="0"/>
+                        </a:spcAft>
+                        <a:buClrTx/>
+                        <a:buSzTx/>
+                        <a:buFontTx/>
+                        <a:buNone/>
+                        <a:tabLst/>
+                        <a:defRPr/>
+                      </a:pPr>
+                      <a:r>
+                        <a:rPr lang="en-GB" sz="1400" dirty="0"/>
+                        <a:t>Meeting</a:t>
+                      </a:r>
+                    </a:p>
+                  </a:txBody>
+                  <a:tcPr anchor="ctr">
+                    <a:solidFill>
+                      <a:schemeClr val="accent3"/>
+                    </a:solidFill>
+                  </a:tcPr>
+                </a:tc>
+                <a:extLst>
+                  <a:ext uri="{0D108BD9-81ED-4DB2-BD59-A6C34878D82A}">
+                    <a16:rowId xmlns:a16="http://schemas.microsoft.com/office/drawing/2014/main" val="871745063"/>
+                  </a:ext>
+                </a:extLst>
+              </a:tr>
+            </a:tbl>
+          </a:graphicData>
+        </a:graphic>
+      </p:graphicFrame>
+      <p:graphicFrame>
+        <p:nvGraphicFramePr>
+          <p:cNvPr id="10" name="Content Placeholder 3"/>
+          <p:cNvGraphicFramePr>
+            <a:graphicFrameLocks/>
+          </p:cNvGraphicFramePr>
+          <p:nvPr>
+            <p:extLst>
+              <p:ext uri="{D42A27DB-BD31-4B8C-83A1-F6EECF244321}">
+                <p14:modId xmlns:p14="http://schemas.microsoft.com/office/powerpoint/2010/main" val="586191756"/>
+              </p:ext>
+            </p:extLst>
+          </p:nvPr>
+        </p:nvGraphicFramePr>
+        <p:xfrm>
+          <a:off x="467544" y="3501008"/>
+          <a:ext cx="8208912" cy="1407160"/>
+        </p:xfrm>
+        <a:graphic>
+          <a:graphicData uri="http://schemas.openxmlformats.org/drawingml/2006/table">
+            <a:tbl>
+              <a:tblPr firstRow="1" bandRow="1">
+                <a:tableStyleId>{5C22544A-7EE6-4342-B048-85BDC9FD1C3A}</a:tableStyleId>
+              </a:tblPr>
+              <a:tblGrid>
+                <a:gridCol w="1368152">
+                  <a:extLst>
+                    <a:ext uri="{9D8B030D-6E8A-4147-A177-3AD203B41FA5}">
+                      <a16:colId xmlns:a16="http://schemas.microsoft.com/office/drawing/2014/main" val="20000"/>
+                    </a:ext>
+                  </a:extLst>
+                </a:gridCol>
+                <a:gridCol w="1368152">
+                  <a:extLst>
+                    <a:ext uri="{9D8B030D-6E8A-4147-A177-3AD203B41FA5}">
+                      <a16:colId xmlns:a16="http://schemas.microsoft.com/office/drawing/2014/main" val="20001"/>
+                    </a:ext>
+                  </a:extLst>
+                </a:gridCol>
+                <a:gridCol w="1440160">
+                  <a:extLst>
+                    <a:ext uri="{9D8B030D-6E8A-4147-A177-3AD203B41FA5}">
+                      <a16:colId xmlns:a16="http://schemas.microsoft.com/office/drawing/2014/main" val="20002"/>
+                    </a:ext>
+                  </a:extLst>
+                </a:gridCol>
+                <a:gridCol w="1296144">
+                  <a:extLst>
+                    <a:ext uri="{9D8B030D-6E8A-4147-A177-3AD203B41FA5}">
+                      <a16:colId xmlns:a16="http://schemas.microsoft.com/office/drawing/2014/main" val="20003"/>
+                    </a:ext>
+                  </a:extLst>
+                </a:gridCol>
+                <a:gridCol w="1368152">
+                  <a:extLst>
+                    <a:ext uri="{9D8B030D-6E8A-4147-A177-3AD203B41FA5}">
+                      <a16:colId xmlns:a16="http://schemas.microsoft.com/office/drawing/2014/main" val="20004"/>
+                    </a:ext>
+                  </a:extLst>
+                </a:gridCol>
+                <a:gridCol w="1368152">
+                  <a:extLst>
+                    <a:ext uri="{9D8B030D-6E8A-4147-A177-3AD203B41FA5}">
+                      <a16:colId xmlns:a16="http://schemas.microsoft.com/office/drawing/2014/main" val="20005"/>
+                    </a:ext>
+                  </a:extLst>
+                </a:gridCol>
+              </a:tblGrid>
+              <a:tr h="370840">
+                <a:tc>
+                  <a:txBody>
+                    <a:bodyPr/>
+                    <a:lstStyle/>
+                    <a:p>
+                      <a:pPr algn="ctr"/>
+                      <a:r>
+                        <a:rPr lang="en-GB" dirty="0"/>
+                        <a:t>Week 7</a:t>
+                      </a:r>
+                    </a:p>
+                  </a:txBody>
+                  <a:tcPr/>
+                </a:tc>
+                <a:tc>
+                  <a:txBody>
+                    <a:bodyPr/>
+                    <a:lstStyle/>
+                    <a:p>
+                      <a:pPr algn="ctr"/>
+                      <a:r>
+                        <a:rPr lang="en-GB" dirty="0"/>
+                        <a:t>Week</a:t>
+                      </a:r>
+                      <a:r>
+                        <a:rPr lang="en-GB" baseline="0" dirty="0"/>
+                        <a:t> 8</a:t>
+                      </a:r>
+                      <a:endParaRPr lang="en-GB" dirty="0"/>
+                    </a:p>
+                  </a:txBody>
+                  <a:tcPr/>
+                </a:tc>
+                <a:tc>
+                  <a:txBody>
+                    <a:bodyPr/>
+                    <a:lstStyle/>
+                    <a:p>
+                      <a:pPr algn="ctr"/>
+                      <a:r>
+                        <a:rPr lang="en-GB" dirty="0"/>
+                        <a:t>Week 9</a:t>
+                      </a:r>
+                    </a:p>
+                  </a:txBody>
+                  <a:tcPr/>
+                </a:tc>
+                <a:tc>
+                  <a:txBody>
+                    <a:bodyPr/>
+                    <a:lstStyle/>
+                    <a:p>
+                      <a:pPr algn="ctr"/>
+                      <a:r>
+                        <a:rPr lang="en-GB" dirty="0"/>
+                        <a:t>Week 10</a:t>
+                      </a:r>
+                    </a:p>
+                  </a:txBody>
+                  <a:tcPr/>
+                </a:tc>
+                <a:tc>
+                  <a:txBody>
+                    <a:bodyPr/>
+                    <a:lstStyle/>
+                    <a:p>
+                      <a:pPr algn="ctr"/>
+                      <a:r>
+                        <a:rPr lang="en-GB" dirty="0"/>
+                        <a:t>Week 11</a:t>
+                      </a:r>
+                    </a:p>
+                  </a:txBody>
+                  <a:tcPr/>
+                </a:tc>
+                <a:tc>
+                  <a:txBody>
+                    <a:bodyPr/>
+                    <a:lstStyle/>
+                    <a:p>
+                      <a:pPr algn="ctr"/>
+                      <a:r>
+                        <a:rPr lang="en-GB" dirty="0"/>
+                        <a:t>Week 12</a:t>
+                      </a:r>
+                    </a:p>
+                  </a:txBody>
+                  <a:tcPr/>
+                </a:tc>
+                <a:extLst>
+                  <a:ext uri="{0D108BD9-81ED-4DB2-BD59-A6C34878D82A}">
+                    <a16:rowId xmlns:a16="http://schemas.microsoft.com/office/drawing/2014/main" val="10000"/>
+                  </a:ext>
+                </a:extLst>
+              </a:tr>
+              <a:tr h="370840">
+                <a:tc>
+                  <a:txBody>
+                    <a:bodyPr/>
+                    <a:lstStyle/>
+                    <a:p>
+                      <a:pPr marL="0" marR="0" lvl="0" indent="0" algn="ctr" defTabSz="914400" rtl="0" eaLnBrk="1" fontAlgn="auto" latinLnBrk="0" hangingPunct="1">
+                        <a:lnSpc>
+                          <a:spcPct val="100000"/>
+                        </a:lnSpc>
+                        <a:spcBef>
+                          <a:spcPts val="0"/>
+                        </a:spcBef>
+                        <a:spcAft>
+                          <a:spcPts val="0"/>
+                        </a:spcAft>
+                        <a:buClrTx/>
+                        <a:buSzTx/>
+                        <a:buFontTx/>
+                        <a:buNone/>
+                        <a:tabLst/>
+                        <a:defRPr/>
+                      </a:pPr>
+                      <a:r>
+                        <a:rPr kumimoji="0" lang="en-GB" sz="1400" b="0" i="0" u="none" strike="noStrike" kern="1200" cap="none" spc="0" normalizeH="0" baseline="0" noProof="0">
+                          <a:ln>
+                            <a:noFill/>
+                          </a:ln>
+                          <a:solidFill>
+                            <a:prstClr val="black"/>
+                          </a:solidFill>
+                          <a:effectLst/>
+                          <a:uLnTx/>
+                          <a:uFillTx/>
+                          <a:latin typeface="Calibri"/>
+                          <a:ea typeface="+mn-ea"/>
+                          <a:cs typeface="+mn-cs"/>
+                        </a:rPr>
+                        <a:t>Support </a:t>
+                      </a:r>
+                    </a:p>
+                    <a:p>
+                      <a:pPr marL="0" marR="0" lvl="0" indent="0" algn="ctr" defTabSz="914400" rtl="0" eaLnBrk="1" fontAlgn="auto" latinLnBrk="0" hangingPunct="1">
+                        <a:lnSpc>
+                          <a:spcPct val="100000"/>
+                        </a:lnSpc>
+                        <a:spcBef>
+                          <a:spcPts val="0"/>
+                        </a:spcBef>
+                        <a:spcAft>
+                          <a:spcPts val="0"/>
+                        </a:spcAft>
+                        <a:buClrTx/>
+                        <a:buSzTx/>
+                        <a:buFontTx/>
+                        <a:buNone/>
+                        <a:tabLst/>
+                        <a:defRPr/>
+                      </a:pPr>
+                      <a:r>
+                        <a:rPr kumimoji="0" lang="en-GB" sz="1400" b="0" i="0" u="none" strike="noStrike" kern="1200" cap="none" spc="0" normalizeH="0" baseline="0" noProof="0">
+                          <a:ln>
+                            <a:noFill/>
+                          </a:ln>
+                          <a:solidFill>
+                            <a:prstClr val="black"/>
+                          </a:solidFill>
+                          <a:effectLst/>
+                          <a:uLnTx/>
+                          <a:uFillTx/>
+                          <a:latin typeface="Calibri"/>
+                          <a:ea typeface="+mn-ea"/>
+                          <a:cs typeface="+mn-cs"/>
+                        </a:rPr>
+                        <a:t>Lecture</a:t>
+                      </a:r>
+                      <a:endParaRPr lang="en-GB" sz="1400" baseline="0" dirty="0"/>
+                    </a:p>
+                  </a:txBody>
+                  <a:tcPr anchor="ctr">
+                    <a:solidFill>
+                      <a:schemeClr val="accent2"/>
+                    </a:solidFill>
+                  </a:tcPr>
+                </a:tc>
+                <a:tc>
+                  <a:txBody>
+                    <a:bodyPr/>
+                    <a:lstStyle/>
+                    <a:p>
+                      <a:pPr marL="0" marR="0" lvl="0" indent="0" algn="ctr" defTabSz="914400" rtl="0" eaLnBrk="1" fontAlgn="auto" latinLnBrk="0" hangingPunct="1">
+                        <a:lnSpc>
+                          <a:spcPct val="100000"/>
+                        </a:lnSpc>
+                        <a:spcBef>
+                          <a:spcPts val="0"/>
+                        </a:spcBef>
+                        <a:spcAft>
+                          <a:spcPts val="0"/>
+                        </a:spcAft>
+                        <a:buClrTx/>
+                        <a:buSzTx/>
+                        <a:buFontTx/>
+                        <a:buNone/>
+                        <a:tabLst/>
+                        <a:defRPr/>
+                      </a:pPr>
+                      <a:r>
+                        <a:rPr kumimoji="0" lang="en-GB" sz="1400" b="0" i="0" u="none" strike="noStrike" kern="1200" cap="none" spc="0" normalizeH="0" baseline="0" noProof="0">
+                          <a:ln>
+                            <a:noFill/>
+                          </a:ln>
+                          <a:solidFill>
+                            <a:prstClr val="black"/>
+                          </a:solidFill>
+                          <a:effectLst/>
+                          <a:uLnTx/>
+                          <a:uFillTx/>
+                          <a:latin typeface="Calibri"/>
+                          <a:ea typeface="+mn-ea"/>
+                          <a:cs typeface="+mn-cs"/>
+                        </a:rPr>
+                        <a:t>Support </a:t>
+                      </a:r>
+                    </a:p>
+                    <a:p>
+                      <a:pPr marL="0" marR="0" lvl="0" indent="0" algn="ctr" defTabSz="914400" rtl="0" eaLnBrk="1" fontAlgn="auto" latinLnBrk="0" hangingPunct="1">
+                        <a:lnSpc>
+                          <a:spcPct val="100000"/>
+                        </a:lnSpc>
+                        <a:spcBef>
+                          <a:spcPts val="0"/>
+                        </a:spcBef>
+                        <a:spcAft>
+                          <a:spcPts val="0"/>
+                        </a:spcAft>
+                        <a:buClrTx/>
+                        <a:buSzTx/>
+                        <a:buFontTx/>
+                        <a:buNone/>
+                        <a:tabLst/>
+                        <a:defRPr/>
+                      </a:pPr>
+                      <a:r>
+                        <a:rPr kumimoji="0" lang="en-GB" sz="1400" b="0" i="0" u="none" strike="noStrike" kern="1200" cap="none" spc="0" normalizeH="0" baseline="0" noProof="0">
+                          <a:ln>
+                            <a:noFill/>
+                          </a:ln>
+                          <a:solidFill>
+                            <a:prstClr val="black"/>
+                          </a:solidFill>
+                          <a:effectLst/>
+                          <a:uLnTx/>
+                          <a:uFillTx/>
+                          <a:latin typeface="Calibri"/>
+                          <a:ea typeface="+mn-ea"/>
+                          <a:cs typeface="+mn-cs"/>
+                        </a:rPr>
+                        <a:t>Lecture</a:t>
+                      </a:r>
+                      <a:endParaRPr lang="en-GB" sz="1400" dirty="0"/>
+                    </a:p>
+                  </a:txBody>
+                  <a:tcPr anchor="ctr">
+                    <a:solidFill>
+                      <a:schemeClr val="accent2"/>
+                    </a:solidFill>
+                  </a:tcPr>
+                </a:tc>
+                <a:tc>
+                  <a:txBody>
+                    <a:bodyPr/>
+                    <a:lstStyle/>
+                    <a:p>
+                      <a:pPr marL="0" marR="0" lvl="0" indent="0" algn="ctr" defTabSz="914400" rtl="0" eaLnBrk="1" fontAlgn="auto" latinLnBrk="0" hangingPunct="1">
+                        <a:lnSpc>
+                          <a:spcPct val="100000"/>
+                        </a:lnSpc>
+                        <a:spcBef>
+                          <a:spcPts val="0"/>
+                        </a:spcBef>
+                        <a:spcAft>
+                          <a:spcPts val="0"/>
+                        </a:spcAft>
+                        <a:buClrTx/>
+                        <a:buSzTx/>
+                        <a:buFontTx/>
+                        <a:buNone/>
+                        <a:tabLst/>
+                        <a:defRPr/>
+                      </a:pPr>
+                      <a:r>
+                        <a:rPr kumimoji="0" lang="en-GB" sz="1400" b="0" i="0" u="none" strike="noStrike" kern="1200" cap="none" spc="0" normalizeH="0" baseline="0" noProof="0">
+                          <a:ln>
+                            <a:noFill/>
+                          </a:ln>
+                          <a:solidFill>
+                            <a:prstClr val="black"/>
+                          </a:solidFill>
+                          <a:effectLst/>
+                          <a:uLnTx/>
+                          <a:uFillTx/>
+                          <a:latin typeface="Calibri"/>
+                          <a:ea typeface="+mn-ea"/>
+                          <a:cs typeface="+mn-cs"/>
+                        </a:rPr>
+                        <a:t>Support </a:t>
+                      </a:r>
+                    </a:p>
+                    <a:p>
+                      <a:pPr marL="0" marR="0" lvl="0" indent="0" algn="ctr" defTabSz="914400" rtl="0" eaLnBrk="1" fontAlgn="auto" latinLnBrk="0" hangingPunct="1">
+                        <a:lnSpc>
+                          <a:spcPct val="100000"/>
+                        </a:lnSpc>
+                        <a:spcBef>
+                          <a:spcPts val="0"/>
+                        </a:spcBef>
+                        <a:spcAft>
+                          <a:spcPts val="0"/>
+                        </a:spcAft>
+                        <a:buClrTx/>
+                        <a:buSzTx/>
+                        <a:buFontTx/>
+                        <a:buNone/>
+                        <a:tabLst/>
+                        <a:defRPr/>
+                      </a:pPr>
+                      <a:r>
+                        <a:rPr kumimoji="0" lang="en-GB" sz="1400" b="0" i="0" u="none" strike="noStrike" kern="1200" cap="none" spc="0" normalizeH="0" baseline="0" noProof="0">
+                          <a:ln>
+                            <a:noFill/>
+                          </a:ln>
+                          <a:solidFill>
+                            <a:prstClr val="black"/>
+                          </a:solidFill>
+                          <a:effectLst/>
+                          <a:uLnTx/>
+                          <a:uFillTx/>
+                          <a:latin typeface="Calibri"/>
+                          <a:ea typeface="+mn-ea"/>
+                          <a:cs typeface="+mn-cs"/>
+                        </a:rPr>
+                        <a:t>Lecture</a:t>
+                      </a:r>
+                      <a:endParaRPr lang="en-GB" sz="1400" dirty="0"/>
+                    </a:p>
+                  </a:txBody>
+                  <a:tcPr anchor="ctr">
+                    <a:solidFill>
+                      <a:schemeClr val="accent2"/>
+                    </a:solidFill>
+                  </a:tcPr>
+                </a:tc>
+                <a:tc>
+                  <a:txBody>
+                    <a:bodyPr/>
+                    <a:lstStyle/>
+                    <a:p>
+                      <a:pPr marL="0" marR="0" lvl="0" indent="0" algn="ctr" defTabSz="914400" rtl="0" eaLnBrk="1" fontAlgn="auto" latinLnBrk="0" hangingPunct="1">
+                        <a:lnSpc>
+                          <a:spcPct val="100000"/>
+                        </a:lnSpc>
+                        <a:spcBef>
+                          <a:spcPts val="0"/>
+                        </a:spcBef>
+                        <a:spcAft>
+                          <a:spcPts val="0"/>
+                        </a:spcAft>
+                        <a:buClrTx/>
+                        <a:buSzTx/>
+                        <a:buFontTx/>
+                        <a:buNone/>
+                        <a:tabLst/>
+                        <a:defRPr/>
+                      </a:pPr>
+                      <a:r>
+                        <a:rPr kumimoji="0" lang="en-GB" sz="1400" b="0" i="0" u="none" strike="noStrike" kern="1200" cap="none" spc="0" normalizeH="0" baseline="0" noProof="0">
+                          <a:ln>
+                            <a:noFill/>
+                          </a:ln>
+                          <a:solidFill>
+                            <a:prstClr val="black"/>
+                          </a:solidFill>
+                          <a:effectLst/>
+                          <a:uLnTx/>
+                          <a:uFillTx/>
+                          <a:latin typeface="Calibri"/>
+                          <a:ea typeface="+mn-ea"/>
+                          <a:cs typeface="+mn-cs"/>
+                        </a:rPr>
+                        <a:t>Support </a:t>
+                      </a:r>
+                    </a:p>
+                    <a:p>
+                      <a:pPr marL="0" marR="0" lvl="0" indent="0" algn="ctr" defTabSz="914400" rtl="0" eaLnBrk="1" fontAlgn="auto" latinLnBrk="0" hangingPunct="1">
+                        <a:lnSpc>
+                          <a:spcPct val="100000"/>
+                        </a:lnSpc>
+                        <a:spcBef>
+                          <a:spcPts val="0"/>
+                        </a:spcBef>
+                        <a:spcAft>
+                          <a:spcPts val="0"/>
+                        </a:spcAft>
+                        <a:buClrTx/>
+                        <a:buSzTx/>
+                        <a:buFontTx/>
+                        <a:buNone/>
+                        <a:tabLst/>
+                        <a:defRPr/>
+                      </a:pPr>
+                      <a:r>
+                        <a:rPr kumimoji="0" lang="en-GB" sz="1400" b="0" i="0" u="none" strike="noStrike" kern="1200" cap="none" spc="0" normalizeH="0" baseline="0" noProof="0">
+                          <a:ln>
+                            <a:noFill/>
+                          </a:ln>
+                          <a:solidFill>
+                            <a:prstClr val="black"/>
+                          </a:solidFill>
+                          <a:effectLst/>
+                          <a:uLnTx/>
+                          <a:uFillTx/>
+                          <a:latin typeface="Calibri"/>
+                          <a:ea typeface="+mn-ea"/>
+                          <a:cs typeface="+mn-cs"/>
+                        </a:rPr>
+                        <a:t>Lecture</a:t>
+                      </a:r>
+                      <a:endParaRPr lang="en-GB" sz="1400" baseline="0" dirty="0"/>
+                    </a:p>
+                  </a:txBody>
+                  <a:tcPr anchor="ctr">
+                    <a:solidFill>
+                      <a:schemeClr val="accent2"/>
+                    </a:solidFill>
+                  </a:tcPr>
+                </a:tc>
+                <a:tc>
+                  <a:txBody>
+                    <a:bodyPr/>
+                    <a:lstStyle/>
+                    <a:p>
+                      <a:pPr marL="0" marR="0" lvl="0" indent="0" algn="ctr" defTabSz="914400" rtl="0" eaLnBrk="1" fontAlgn="auto" latinLnBrk="0" hangingPunct="1">
+                        <a:lnSpc>
+                          <a:spcPct val="100000"/>
+                        </a:lnSpc>
+                        <a:spcBef>
+                          <a:spcPts val="0"/>
+                        </a:spcBef>
+                        <a:spcAft>
+                          <a:spcPts val="0"/>
+                        </a:spcAft>
+                        <a:buClrTx/>
+                        <a:buSzTx/>
+                        <a:buFontTx/>
+                        <a:buNone/>
+                        <a:tabLst/>
+                        <a:defRPr/>
+                      </a:pPr>
+                      <a:r>
+                        <a:rPr kumimoji="0" lang="en-GB" sz="1400" b="0" i="0" u="none" strike="noStrike" kern="1200" cap="none" spc="0" normalizeH="0" baseline="0" noProof="0">
+                          <a:ln>
+                            <a:noFill/>
+                          </a:ln>
+                          <a:solidFill>
+                            <a:prstClr val="black"/>
+                          </a:solidFill>
+                          <a:effectLst/>
+                          <a:uLnTx/>
+                          <a:uFillTx/>
+                          <a:latin typeface="Calibri"/>
+                          <a:ea typeface="+mn-ea"/>
+                          <a:cs typeface="+mn-cs"/>
+                        </a:rPr>
+                        <a:t>Support </a:t>
+                      </a:r>
+                    </a:p>
+                    <a:p>
+                      <a:pPr marL="0" marR="0" lvl="0" indent="0" algn="ctr" defTabSz="914400" rtl="0" eaLnBrk="1" fontAlgn="auto" latinLnBrk="0" hangingPunct="1">
+                        <a:lnSpc>
+                          <a:spcPct val="100000"/>
+                        </a:lnSpc>
+                        <a:spcBef>
+                          <a:spcPts val="0"/>
+                        </a:spcBef>
+                        <a:spcAft>
+                          <a:spcPts val="0"/>
+                        </a:spcAft>
+                        <a:buClrTx/>
+                        <a:buSzTx/>
+                        <a:buFontTx/>
+                        <a:buNone/>
+                        <a:tabLst/>
+                        <a:defRPr/>
+                      </a:pPr>
+                      <a:r>
+                        <a:rPr kumimoji="0" lang="en-GB" sz="1400" b="0" i="0" u="none" strike="noStrike" kern="1200" cap="none" spc="0" normalizeH="0" baseline="0" noProof="0">
+                          <a:ln>
+                            <a:noFill/>
+                          </a:ln>
+                          <a:solidFill>
+                            <a:prstClr val="black"/>
+                          </a:solidFill>
+                          <a:effectLst/>
+                          <a:uLnTx/>
+                          <a:uFillTx/>
+                          <a:latin typeface="Calibri"/>
+                          <a:ea typeface="+mn-ea"/>
+                          <a:cs typeface="+mn-cs"/>
+                        </a:rPr>
+                        <a:t>Lecture</a:t>
+                      </a:r>
+                      <a:endParaRPr lang="en-GB" sz="1400" dirty="0"/>
+                    </a:p>
+                  </a:txBody>
+                  <a:tcPr anchor="ctr">
+                    <a:solidFill>
+                      <a:schemeClr val="accent2"/>
+                    </a:solidFill>
+                  </a:tcPr>
+                </a:tc>
+                <a:tc>
+                  <a:txBody>
+                    <a:bodyPr/>
+                    <a:lstStyle/>
+                    <a:p>
+                      <a:pPr marL="0" marR="0" lvl="0" indent="0" algn="ctr" defTabSz="914400" rtl="0" eaLnBrk="1" fontAlgn="auto" latinLnBrk="0" hangingPunct="1">
+                        <a:lnSpc>
+                          <a:spcPct val="100000"/>
+                        </a:lnSpc>
+                        <a:spcBef>
+                          <a:spcPts val="0"/>
+                        </a:spcBef>
+                        <a:spcAft>
+                          <a:spcPts val="0"/>
+                        </a:spcAft>
+                        <a:buClrTx/>
+                        <a:buSzTx/>
+                        <a:buFontTx/>
+                        <a:buNone/>
+                        <a:tabLst/>
+                        <a:defRPr/>
+                      </a:pPr>
+                      <a:r>
+                        <a:rPr kumimoji="0" lang="en-GB" sz="1400" b="0" i="0" u="none" strike="noStrike" kern="1200" cap="none" spc="0" normalizeH="0" baseline="0" noProof="0" dirty="0">
+                          <a:ln>
+                            <a:noFill/>
+                          </a:ln>
+                          <a:solidFill>
+                            <a:prstClr val="black"/>
+                          </a:solidFill>
+                          <a:effectLst/>
+                          <a:uLnTx/>
+                          <a:uFillTx/>
+                          <a:latin typeface="Calibri"/>
+                          <a:ea typeface="+mn-ea"/>
+                          <a:cs typeface="+mn-cs"/>
+                        </a:rPr>
+                        <a:t>Support </a:t>
+                      </a:r>
+                    </a:p>
+                    <a:p>
+                      <a:pPr marL="0" marR="0" lvl="0" indent="0" algn="ctr" defTabSz="914400" rtl="0" eaLnBrk="1" fontAlgn="auto" latinLnBrk="0" hangingPunct="1">
+                        <a:lnSpc>
+                          <a:spcPct val="100000"/>
+                        </a:lnSpc>
+                        <a:spcBef>
+                          <a:spcPts val="0"/>
+                        </a:spcBef>
+                        <a:spcAft>
+                          <a:spcPts val="0"/>
+                        </a:spcAft>
+                        <a:buClrTx/>
+                        <a:buSzTx/>
+                        <a:buFontTx/>
+                        <a:buNone/>
+                        <a:tabLst/>
+                        <a:defRPr/>
+                      </a:pPr>
+                      <a:r>
+                        <a:rPr kumimoji="0" lang="en-GB" sz="1400" b="0" i="0" u="none" strike="noStrike" kern="1200" cap="none" spc="0" normalizeH="0" baseline="0" noProof="0" dirty="0">
+                          <a:ln>
+                            <a:noFill/>
+                          </a:ln>
+                          <a:solidFill>
+                            <a:prstClr val="black"/>
+                          </a:solidFill>
+                          <a:effectLst/>
+                          <a:uLnTx/>
+                          <a:uFillTx/>
+                          <a:latin typeface="Calibri"/>
+                          <a:ea typeface="+mn-ea"/>
+                          <a:cs typeface="+mn-cs"/>
+                        </a:rPr>
+                        <a:t>Lecture</a:t>
+                      </a:r>
+                      <a:endParaRPr lang="en-GB" sz="1400" dirty="0"/>
+                    </a:p>
+                  </a:txBody>
+                  <a:tcPr anchor="ctr">
+                    <a:solidFill>
+                      <a:schemeClr val="accent2"/>
+                    </a:solidFill>
+                  </a:tcPr>
+                </a:tc>
+                <a:extLst>
+                  <a:ext uri="{0D108BD9-81ED-4DB2-BD59-A6C34878D82A}">
+                    <a16:rowId xmlns:a16="http://schemas.microsoft.com/office/drawing/2014/main" val="10001"/>
+                  </a:ext>
+                </a:extLst>
+              </a:tr>
+              <a:tr h="370840">
+                <a:tc>
+                  <a:txBody>
+                    <a:bodyPr/>
+                    <a:lstStyle/>
+                    <a:p>
+                      <a:pPr marL="0" marR="0" lvl="0" indent="0" algn="ctr" defTabSz="914400" rtl="0" eaLnBrk="1" fontAlgn="auto" latinLnBrk="0" hangingPunct="1">
+                        <a:lnSpc>
+                          <a:spcPct val="100000"/>
+                        </a:lnSpc>
+                        <a:spcBef>
+                          <a:spcPts val="0"/>
+                        </a:spcBef>
+                        <a:spcAft>
+                          <a:spcPts val="0"/>
+                        </a:spcAft>
+                        <a:buClrTx/>
+                        <a:buSzTx/>
+                        <a:buFontTx/>
+                        <a:buNone/>
+                        <a:tabLst/>
+                        <a:defRPr/>
+                      </a:pPr>
+                      <a:r>
+                        <a:rPr kumimoji="0" lang="en-GB" sz="1400" b="0" i="0" u="none" strike="noStrike" kern="1200" cap="none" spc="0" normalizeH="0" baseline="0" noProof="0">
+                          <a:ln>
+                            <a:noFill/>
+                          </a:ln>
+                          <a:solidFill>
+                            <a:prstClr val="black"/>
+                          </a:solidFill>
+                          <a:effectLst/>
+                          <a:uLnTx/>
+                          <a:uFillTx/>
+                          <a:latin typeface="Calibri"/>
+                          <a:ea typeface="+mn-ea"/>
+                          <a:cs typeface="+mn-cs"/>
+                        </a:rPr>
+                        <a:t>Supervisor</a:t>
+                      </a:r>
+                    </a:p>
+                    <a:p>
+                      <a:pPr marL="0" marR="0" lvl="0" indent="0" algn="ctr" defTabSz="914400" rtl="0" eaLnBrk="1" fontAlgn="auto" latinLnBrk="0" hangingPunct="1">
+                        <a:lnSpc>
+                          <a:spcPct val="100000"/>
+                        </a:lnSpc>
+                        <a:spcBef>
+                          <a:spcPts val="0"/>
+                        </a:spcBef>
+                        <a:spcAft>
+                          <a:spcPts val="0"/>
+                        </a:spcAft>
+                        <a:buClrTx/>
+                        <a:buSzTx/>
+                        <a:buFontTx/>
+                        <a:buNone/>
+                        <a:tabLst/>
+                        <a:defRPr/>
+                      </a:pPr>
+                      <a:r>
+                        <a:rPr kumimoji="0" lang="en-GB" sz="1400" b="0" i="0" u="none" strike="noStrike" kern="1200" cap="none" spc="0" normalizeH="0" baseline="0" noProof="0">
+                          <a:ln>
+                            <a:noFill/>
+                          </a:ln>
+                          <a:solidFill>
+                            <a:prstClr val="black"/>
+                          </a:solidFill>
+                          <a:effectLst/>
+                          <a:uLnTx/>
+                          <a:uFillTx/>
+                          <a:latin typeface="Calibri"/>
+                          <a:ea typeface="+mn-ea"/>
+                          <a:cs typeface="+mn-cs"/>
+                        </a:rPr>
+                        <a:t>Meeting</a:t>
+                      </a:r>
+                      <a:endParaRPr kumimoji="0" lang="en-GB" sz="1400" b="0" i="0" u="none" strike="noStrike" kern="1200" cap="none" spc="0" normalizeH="0" baseline="0" noProof="0" dirty="0">
+                        <a:ln>
+                          <a:noFill/>
+                        </a:ln>
+                        <a:solidFill>
+                          <a:prstClr val="black"/>
+                        </a:solidFill>
+                        <a:effectLst/>
+                        <a:uLnTx/>
+                        <a:uFillTx/>
+                        <a:latin typeface="Calibri"/>
+                        <a:ea typeface="+mn-ea"/>
+                        <a:cs typeface="+mn-cs"/>
+                      </a:endParaRPr>
+                    </a:p>
+                  </a:txBody>
+                  <a:tcPr anchor="ctr">
+                    <a:solidFill>
+                      <a:schemeClr val="accent3"/>
+                    </a:solidFill>
+                  </a:tcPr>
+                </a:tc>
+                <a:tc>
+                  <a:txBody>
+                    <a:bodyPr/>
+                    <a:lstStyle/>
+                    <a:p>
+                      <a:pPr marL="0" marR="0" lvl="0" indent="0" algn="ctr" defTabSz="914400" rtl="0" eaLnBrk="1" fontAlgn="auto" latinLnBrk="0" hangingPunct="1">
+                        <a:lnSpc>
+                          <a:spcPct val="100000"/>
+                        </a:lnSpc>
+                        <a:spcBef>
+                          <a:spcPts val="0"/>
+                        </a:spcBef>
+                        <a:spcAft>
+                          <a:spcPts val="0"/>
+                        </a:spcAft>
+                        <a:buClrTx/>
+                        <a:buSzTx/>
+                        <a:buFontTx/>
+                        <a:buNone/>
+                        <a:tabLst/>
+                        <a:defRPr/>
+                      </a:pPr>
+                      <a:r>
+                        <a:rPr kumimoji="0" lang="en-GB" sz="1400" b="0" i="0" u="none" strike="noStrike" kern="1200" cap="none" spc="0" normalizeH="0" baseline="0" noProof="0">
+                          <a:ln>
+                            <a:noFill/>
+                          </a:ln>
+                          <a:solidFill>
+                            <a:prstClr val="black"/>
+                          </a:solidFill>
+                          <a:effectLst/>
+                          <a:uLnTx/>
+                          <a:uFillTx/>
+                          <a:latin typeface="Calibri"/>
+                          <a:ea typeface="+mn-ea"/>
+                          <a:cs typeface="+mn-cs"/>
+                        </a:rPr>
+                        <a:t>Supervisor</a:t>
+                      </a:r>
+                    </a:p>
+                    <a:p>
+                      <a:pPr marL="0" marR="0" lvl="0" indent="0" algn="ctr" defTabSz="914400" rtl="0" eaLnBrk="1" fontAlgn="auto" latinLnBrk="0" hangingPunct="1">
+                        <a:lnSpc>
+                          <a:spcPct val="100000"/>
+                        </a:lnSpc>
+                        <a:spcBef>
+                          <a:spcPts val="0"/>
+                        </a:spcBef>
+                        <a:spcAft>
+                          <a:spcPts val="0"/>
+                        </a:spcAft>
+                        <a:buClrTx/>
+                        <a:buSzTx/>
+                        <a:buFontTx/>
+                        <a:buNone/>
+                        <a:tabLst/>
+                        <a:defRPr/>
+                      </a:pPr>
+                      <a:r>
+                        <a:rPr kumimoji="0" lang="en-GB" sz="1400" b="0" i="0" u="none" strike="noStrike" kern="1200" cap="none" spc="0" normalizeH="0" baseline="0" noProof="0">
+                          <a:ln>
+                            <a:noFill/>
+                          </a:ln>
+                          <a:solidFill>
+                            <a:prstClr val="black"/>
+                          </a:solidFill>
+                          <a:effectLst/>
+                          <a:uLnTx/>
+                          <a:uFillTx/>
+                          <a:latin typeface="Calibri"/>
+                          <a:ea typeface="+mn-ea"/>
+                          <a:cs typeface="+mn-cs"/>
+                        </a:rPr>
+                        <a:t>Meeting</a:t>
+                      </a:r>
+                      <a:endParaRPr kumimoji="0" lang="en-GB" sz="1400" b="0" i="0" u="none" strike="noStrike" kern="1200" cap="none" spc="0" normalizeH="0" baseline="0" noProof="0" dirty="0">
+                        <a:ln>
+                          <a:noFill/>
+                        </a:ln>
+                        <a:solidFill>
+                          <a:prstClr val="black"/>
+                        </a:solidFill>
+                        <a:effectLst/>
+                        <a:uLnTx/>
+                        <a:uFillTx/>
+                        <a:latin typeface="Calibri"/>
+                        <a:ea typeface="+mn-ea"/>
+                        <a:cs typeface="+mn-cs"/>
+                      </a:endParaRPr>
+                    </a:p>
+                  </a:txBody>
+                  <a:tcPr anchor="ctr">
+                    <a:solidFill>
+                      <a:schemeClr val="accent3"/>
+                    </a:solidFill>
+                  </a:tcPr>
+                </a:tc>
+                <a:tc>
+                  <a:txBody>
+                    <a:bodyPr/>
+                    <a:lstStyle/>
+                    <a:p>
+                      <a:pPr marL="0" marR="0" lvl="0" indent="0" algn="ctr" defTabSz="914400" rtl="0" eaLnBrk="1" fontAlgn="auto" latinLnBrk="0" hangingPunct="1">
+                        <a:lnSpc>
+                          <a:spcPct val="100000"/>
+                        </a:lnSpc>
+                        <a:spcBef>
+                          <a:spcPts val="0"/>
+                        </a:spcBef>
+                        <a:spcAft>
+                          <a:spcPts val="0"/>
+                        </a:spcAft>
+                        <a:buClrTx/>
+                        <a:buSzTx/>
+                        <a:buFontTx/>
+                        <a:buNone/>
+                        <a:tabLst/>
+                        <a:defRPr/>
+                      </a:pPr>
+                      <a:r>
+                        <a:rPr kumimoji="0" lang="en-GB" sz="1400" b="0" i="0" u="none" strike="noStrike" kern="1200" cap="none" spc="0" normalizeH="0" baseline="0" noProof="0">
+                          <a:ln>
+                            <a:noFill/>
+                          </a:ln>
+                          <a:solidFill>
+                            <a:prstClr val="black"/>
+                          </a:solidFill>
+                          <a:effectLst/>
+                          <a:uLnTx/>
+                          <a:uFillTx/>
+                          <a:latin typeface="Calibri"/>
+                          <a:ea typeface="+mn-ea"/>
+                          <a:cs typeface="+mn-cs"/>
+                        </a:rPr>
+                        <a:t>Supervisor</a:t>
+                      </a:r>
+                    </a:p>
+                    <a:p>
+                      <a:pPr marL="0" marR="0" lvl="0" indent="0" algn="ctr" defTabSz="914400" rtl="0" eaLnBrk="1" fontAlgn="auto" latinLnBrk="0" hangingPunct="1">
+                        <a:lnSpc>
+                          <a:spcPct val="100000"/>
+                        </a:lnSpc>
+                        <a:spcBef>
+                          <a:spcPts val="0"/>
+                        </a:spcBef>
+                        <a:spcAft>
+                          <a:spcPts val="0"/>
+                        </a:spcAft>
+                        <a:buClrTx/>
+                        <a:buSzTx/>
+                        <a:buFontTx/>
+                        <a:buNone/>
+                        <a:tabLst/>
+                        <a:defRPr/>
+                      </a:pPr>
+                      <a:r>
+                        <a:rPr kumimoji="0" lang="en-GB" sz="1400" b="0" i="0" u="none" strike="noStrike" kern="1200" cap="none" spc="0" normalizeH="0" baseline="0" noProof="0">
+                          <a:ln>
+                            <a:noFill/>
+                          </a:ln>
+                          <a:solidFill>
+                            <a:prstClr val="black"/>
+                          </a:solidFill>
+                          <a:effectLst/>
+                          <a:uLnTx/>
+                          <a:uFillTx/>
+                          <a:latin typeface="Calibri"/>
+                          <a:ea typeface="+mn-ea"/>
+                          <a:cs typeface="+mn-cs"/>
+                        </a:rPr>
+                        <a:t>Meeting</a:t>
+                      </a:r>
+                      <a:endParaRPr kumimoji="0" lang="en-GB" sz="1400" b="0" i="0" u="none" strike="noStrike" kern="1200" cap="none" spc="0" normalizeH="0" baseline="0" noProof="0" dirty="0">
+                        <a:ln>
+                          <a:noFill/>
+                        </a:ln>
+                        <a:solidFill>
+                          <a:prstClr val="black"/>
+                        </a:solidFill>
+                        <a:effectLst/>
+                        <a:uLnTx/>
+                        <a:uFillTx/>
+                        <a:latin typeface="Calibri"/>
+                        <a:ea typeface="+mn-ea"/>
+                        <a:cs typeface="+mn-cs"/>
+                      </a:endParaRPr>
+                    </a:p>
+                  </a:txBody>
+                  <a:tcPr anchor="ctr">
+                    <a:solidFill>
+                      <a:schemeClr val="accent3"/>
+                    </a:solidFill>
+                  </a:tcPr>
+                </a:tc>
+                <a:tc>
+                  <a:txBody>
+                    <a:bodyPr/>
+                    <a:lstStyle/>
+                    <a:p>
+                      <a:pPr marL="0" marR="0" lvl="0" indent="0" algn="ctr" defTabSz="914400" rtl="0" eaLnBrk="1" fontAlgn="auto" latinLnBrk="0" hangingPunct="1">
+                        <a:lnSpc>
+                          <a:spcPct val="100000"/>
+                        </a:lnSpc>
+                        <a:spcBef>
+                          <a:spcPts val="0"/>
+                        </a:spcBef>
+                        <a:spcAft>
+                          <a:spcPts val="0"/>
+                        </a:spcAft>
+                        <a:buClrTx/>
+                        <a:buSzTx/>
+                        <a:buFontTx/>
+                        <a:buNone/>
+                        <a:tabLst/>
+                        <a:defRPr/>
+                      </a:pPr>
+                      <a:r>
+                        <a:rPr kumimoji="0" lang="en-GB" sz="1400" b="0" i="0" u="none" strike="noStrike" kern="1200" cap="none" spc="0" normalizeH="0" baseline="0" noProof="0">
+                          <a:ln>
+                            <a:noFill/>
+                          </a:ln>
+                          <a:solidFill>
+                            <a:prstClr val="black"/>
+                          </a:solidFill>
+                          <a:effectLst/>
+                          <a:uLnTx/>
+                          <a:uFillTx/>
+                          <a:latin typeface="Calibri"/>
+                          <a:ea typeface="+mn-ea"/>
+                          <a:cs typeface="+mn-cs"/>
+                        </a:rPr>
+                        <a:t>Supervisor</a:t>
+                      </a:r>
+                    </a:p>
+                    <a:p>
+                      <a:pPr marL="0" marR="0" lvl="0" indent="0" algn="ctr" defTabSz="914400" rtl="0" eaLnBrk="1" fontAlgn="auto" latinLnBrk="0" hangingPunct="1">
+                        <a:lnSpc>
+                          <a:spcPct val="100000"/>
+                        </a:lnSpc>
+                        <a:spcBef>
+                          <a:spcPts val="0"/>
+                        </a:spcBef>
+                        <a:spcAft>
+                          <a:spcPts val="0"/>
+                        </a:spcAft>
+                        <a:buClrTx/>
+                        <a:buSzTx/>
+                        <a:buFontTx/>
+                        <a:buNone/>
+                        <a:tabLst/>
+                        <a:defRPr/>
+                      </a:pPr>
+                      <a:r>
+                        <a:rPr kumimoji="0" lang="en-GB" sz="1400" b="0" i="0" u="none" strike="noStrike" kern="1200" cap="none" spc="0" normalizeH="0" baseline="0" noProof="0">
+                          <a:ln>
+                            <a:noFill/>
+                          </a:ln>
+                          <a:solidFill>
+                            <a:prstClr val="black"/>
+                          </a:solidFill>
+                          <a:effectLst/>
+                          <a:uLnTx/>
+                          <a:uFillTx/>
+                          <a:latin typeface="Calibri"/>
+                          <a:ea typeface="+mn-ea"/>
+                          <a:cs typeface="+mn-cs"/>
+                        </a:rPr>
+                        <a:t>Meeting</a:t>
+                      </a:r>
+                      <a:endParaRPr kumimoji="0" lang="en-GB" sz="1400" b="0" i="0" u="none" strike="noStrike" kern="1200" cap="none" spc="0" normalizeH="0" baseline="0" noProof="0" dirty="0">
+                        <a:ln>
+                          <a:noFill/>
+                        </a:ln>
+                        <a:solidFill>
+                          <a:prstClr val="black"/>
+                        </a:solidFill>
+                        <a:effectLst/>
+                        <a:uLnTx/>
+                        <a:uFillTx/>
+                        <a:latin typeface="Calibri"/>
+                        <a:ea typeface="+mn-ea"/>
+                        <a:cs typeface="+mn-cs"/>
+                      </a:endParaRPr>
+                    </a:p>
+                  </a:txBody>
+                  <a:tcPr anchor="ctr">
+                    <a:solidFill>
+                      <a:schemeClr val="accent3"/>
+                    </a:solidFill>
+                  </a:tcPr>
+                </a:tc>
+                <a:tc>
+                  <a:txBody>
+                    <a:bodyPr/>
+                    <a:lstStyle/>
+                    <a:p>
+                      <a:pPr marL="0" marR="0" lvl="0" indent="0" algn="ctr" defTabSz="914400" rtl="0" eaLnBrk="1" fontAlgn="auto" latinLnBrk="0" hangingPunct="1">
+                        <a:lnSpc>
+                          <a:spcPct val="100000"/>
+                        </a:lnSpc>
+                        <a:spcBef>
+                          <a:spcPts val="0"/>
+                        </a:spcBef>
+                        <a:spcAft>
+                          <a:spcPts val="0"/>
+                        </a:spcAft>
+                        <a:buClrTx/>
+                        <a:buSzTx/>
+                        <a:buFontTx/>
+                        <a:buNone/>
+                        <a:tabLst/>
+                        <a:defRPr/>
+                      </a:pPr>
+                      <a:r>
+                        <a:rPr kumimoji="0" lang="en-GB" sz="1400" b="0" i="0" u="none" strike="noStrike" kern="1200" cap="none" spc="0" normalizeH="0" baseline="0" noProof="0">
+                          <a:ln>
+                            <a:noFill/>
+                          </a:ln>
+                          <a:solidFill>
+                            <a:prstClr val="black"/>
+                          </a:solidFill>
+                          <a:effectLst/>
+                          <a:uLnTx/>
+                          <a:uFillTx/>
+                          <a:latin typeface="Calibri"/>
+                          <a:ea typeface="+mn-ea"/>
+                          <a:cs typeface="+mn-cs"/>
+                        </a:rPr>
+                        <a:t>Supervisor</a:t>
+                      </a:r>
+                    </a:p>
+                    <a:p>
+                      <a:pPr marL="0" marR="0" lvl="0" indent="0" algn="ctr" defTabSz="914400" rtl="0" eaLnBrk="1" fontAlgn="auto" latinLnBrk="0" hangingPunct="1">
+                        <a:lnSpc>
+                          <a:spcPct val="100000"/>
+                        </a:lnSpc>
+                        <a:spcBef>
+                          <a:spcPts val="0"/>
+                        </a:spcBef>
+                        <a:spcAft>
+                          <a:spcPts val="0"/>
+                        </a:spcAft>
+                        <a:buClrTx/>
+                        <a:buSzTx/>
+                        <a:buFontTx/>
+                        <a:buNone/>
+                        <a:tabLst/>
+                        <a:defRPr/>
+                      </a:pPr>
+                      <a:r>
+                        <a:rPr kumimoji="0" lang="en-GB" sz="1400" b="0" i="0" u="none" strike="noStrike" kern="1200" cap="none" spc="0" normalizeH="0" baseline="0" noProof="0">
+                          <a:ln>
+                            <a:noFill/>
+                          </a:ln>
+                          <a:solidFill>
+                            <a:prstClr val="black"/>
+                          </a:solidFill>
+                          <a:effectLst/>
+                          <a:uLnTx/>
+                          <a:uFillTx/>
+                          <a:latin typeface="Calibri"/>
+                          <a:ea typeface="+mn-ea"/>
+                          <a:cs typeface="+mn-cs"/>
+                        </a:rPr>
+                        <a:t>Meeting</a:t>
+                      </a:r>
+                      <a:endParaRPr kumimoji="0" lang="en-GB" sz="1400" b="0" i="0" u="none" strike="noStrike" kern="1200" cap="none" spc="0" normalizeH="0" baseline="0" noProof="0" dirty="0">
+                        <a:ln>
+                          <a:noFill/>
+                        </a:ln>
+                        <a:solidFill>
+                          <a:prstClr val="black"/>
+                        </a:solidFill>
+                        <a:effectLst/>
+                        <a:uLnTx/>
+                        <a:uFillTx/>
+                        <a:latin typeface="Calibri"/>
+                        <a:ea typeface="+mn-ea"/>
+                        <a:cs typeface="+mn-cs"/>
+                      </a:endParaRPr>
+                    </a:p>
+                  </a:txBody>
+                  <a:tcPr anchor="ctr">
+                    <a:solidFill>
+                      <a:schemeClr val="accent3"/>
+                    </a:solidFill>
+                  </a:tcPr>
+                </a:tc>
+                <a:tc>
+                  <a:txBody>
+                    <a:bodyPr/>
+                    <a:lstStyle/>
+                    <a:p>
+                      <a:pPr marL="0" marR="0" lvl="0" indent="0" algn="ctr" defTabSz="914400" rtl="0" eaLnBrk="1" fontAlgn="auto" latinLnBrk="0" hangingPunct="1">
+                        <a:lnSpc>
+                          <a:spcPct val="100000"/>
+                        </a:lnSpc>
+                        <a:spcBef>
+                          <a:spcPts val="0"/>
+                        </a:spcBef>
+                        <a:spcAft>
+                          <a:spcPts val="0"/>
+                        </a:spcAft>
+                        <a:buClrTx/>
+                        <a:buSzTx/>
+                        <a:buFontTx/>
+                        <a:buNone/>
+                        <a:tabLst/>
+                        <a:defRPr/>
+                      </a:pPr>
+                      <a:r>
+                        <a:rPr kumimoji="0" lang="en-GB" sz="1400" b="0" i="0" u="none" strike="noStrike" kern="1200" cap="none" spc="0" normalizeH="0" baseline="0" noProof="0" dirty="0">
+                          <a:ln>
+                            <a:noFill/>
+                          </a:ln>
+                          <a:solidFill>
+                            <a:prstClr val="black"/>
+                          </a:solidFill>
+                          <a:effectLst/>
+                          <a:uLnTx/>
+                          <a:uFillTx/>
+                          <a:latin typeface="Calibri"/>
+                          <a:ea typeface="+mn-ea"/>
+                          <a:cs typeface="+mn-cs"/>
+                        </a:rPr>
+                        <a:t>Supervisor</a:t>
+                      </a:r>
+                    </a:p>
+                    <a:p>
+                      <a:pPr marL="0" marR="0" lvl="0" indent="0" algn="ctr" defTabSz="914400" rtl="0" eaLnBrk="1" fontAlgn="auto" latinLnBrk="0" hangingPunct="1">
+                        <a:lnSpc>
+                          <a:spcPct val="100000"/>
+                        </a:lnSpc>
+                        <a:spcBef>
+                          <a:spcPts val="0"/>
+                        </a:spcBef>
+                        <a:spcAft>
+                          <a:spcPts val="0"/>
+                        </a:spcAft>
+                        <a:buClrTx/>
+                        <a:buSzTx/>
+                        <a:buFontTx/>
+                        <a:buNone/>
+                        <a:tabLst/>
+                        <a:defRPr/>
+                      </a:pPr>
+                      <a:r>
+                        <a:rPr kumimoji="0" lang="en-GB" sz="1400" b="0" i="0" u="none" strike="noStrike" kern="1200" cap="none" spc="0" normalizeH="0" baseline="0" noProof="0" dirty="0">
+                          <a:ln>
+                            <a:noFill/>
+                          </a:ln>
+                          <a:solidFill>
+                            <a:prstClr val="black"/>
+                          </a:solidFill>
+                          <a:effectLst/>
+                          <a:uLnTx/>
+                          <a:uFillTx/>
+                          <a:latin typeface="Calibri"/>
+                          <a:ea typeface="+mn-ea"/>
+                          <a:cs typeface="+mn-cs"/>
+                        </a:rPr>
+                        <a:t>Meeting</a:t>
+                      </a:r>
+                    </a:p>
+                  </a:txBody>
+                  <a:tcPr anchor="ctr">
+                    <a:solidFill>
+                      <a:schemeClr val="accent3"/>
+                    </a:solidFill>
+                  </a:tcPr>
+                </a:tc>
+                <a:extLst>
+                  <a:ext uri="{0D108BD9-81ED-4DB2-BD59-A6C34878D82A}">
+                    <a16:rowId xmlns:a16="http://schemas.microsoft.com/office/drawing/2014/main" val="3897389130"/>
+                  </a:ext>
+                </a:extLst>
+              </a:tr>
+            </a:tbl>
+          </a:graphicData>
+        </a:graphic>
+      </p:graphicFrame>
+      <p:graphicFrame>
+        <p:nvGraphicFramePr>
+          <p:cNvPr id="7" name="Content Placeholder 3">
+            <a:extLst>
+              <a:ext uri="{FF2B5EF4-FFF2-40B4-BE49-F238E27FC236}">
+                <a16:creationId xmlns:a16="http://schemas.microsoft.com/office/drawing/2014/main" id="{1FDBB499-B236-453B-BFE1-0247D66A5A2D}"/>
+              </a:ext>
+            </a:extLst>
+          </p:cNvPr>
+          <p:cNvGraphicFramePr>
+            <a:graphicFrameLocks/>
+          </p:cNvGraphicFramePr>
+          <p:nvPr>
+            <p:extLst>
+              <p:ext uri="{D42A27DB-BD31-4B8C-83A1-F6EECF244321}">
+                <p14:modId xmlns:p14="http://schemas.microsoft.com/office/powerpoint/2010/main" val="1592212119"/>
+              </p:ext>
+            </p:extLst>
+          </p:nvPr>
+        </p:nvGraphicFramePr>
+        <p:xfrm>
+          <a:off x="467544" y="5216991"/>
+          <a:ext cx="1368152" cy="889000"/>
+        </p:xfrm>
+        <a:graphic>
+          <a:graphicData uri="http://schemas.openxmlformats.org/drawingml/2006/table">
+            <a:tbl>
+              <a:tblPr firstRow="1" bandRow="1">
+                <a:tableStyleId>{5C22544A-7EE6-4342-B048-85BDC9FD1C3A}</a:tableStyleId>
+              </a:tblPr>
+              <a:tblGrid>
+                <a:gridCol w="1368152">
+                  <a:extLst>
+                    <a:ext uri="{9D8B030D-6E8A-4147-A177-3AD203B41FA5}">
+                      <a16:colId xmlns:a16="http://schemas.microsoft.com/office/drawing/2014/main" val="20000"/>
+                    </a:ext>
+                  </a:extLst>
+                </a:gridCol>
+              </a:tblGrid>
+              <a:tr h="370840">
+                <a:tc>
+                  <a:txBody>
+                    <a:bodyPr/>
+                    <a:lstStyle/>
+                    <a:p>
+                      <a:pPr algn="ctr"/>
+                      <a:r>
+                        <a:rPr lang="en-GB" dirty="0"/>
+                        <a:t>Week 13</a:t>
+                      </a:r>
+                    </a:p>
+                  </a:txBody>
+                  <a:tcPr/>
+                </a:tc>
+                <a:extLst>
+                  <a:ext uri="{0D108BD9-81ED-4DB2-BD59-A6C34878D82A}">
+                    <a16:rowId xmlns:a16="http://schemas.microsoft.com/office/drawing/2014/main" val="10000"/>
+                  </a:ext>
+                </a:extLst>
+              </a:tr>
+              <a:tr h="370840">
+                <a:tc>
+                  <a:txBody>
+                    <a:bodyPr/>
+                    <a:lstStyle/>
+                    <a:p>
+                      <a:pPr algn="ctr"/>
+                      <a:r>
+                        <a:rPr lang="en-GB" sz="1400" baseline="0" dirty="0"/>
+                        <a:t>Demo</a:t>
+                      </a:r>
+                    </a:p>
+                    <a:p>
+                      <a:pPr algn="ctr"/>
+                      <a:r>
+                        <a:rPr lang="en-GB" sz="1400" baseline="0" dirty="0"/>
+                        <a:t>Day</a:t>
+                      </a:r>
+                    </a:p>
+                  </a:txBody>
+                  <a:tcPr anchor="ctr">
+                    <a:solidFill>
+                      <a:schemeClr val="accent6">
+                        <a:lumMod val="40000"/>
+                        <a:lumOff val="60000"/>
+                      </a:schemeClr>
+                    </a:solidFill>
+                  </a:tcPr>
+                </a:tc>
+                <a:extLst>
+                  <a:ext uri="{0D108BD9-81ED-4DB2-BD59-A6C34878D82A}">
+                    <a16:rowId xmlns:a16="http://schemas.microsoft.com/office/drawing/2014/main" val="10001"/>
+                  </a:ext>
+                </a:extLst>
+              </a:tr>
+            </a:tbl>
+          </a:graphicData>
+        </a:graphic>
+      </p:graphicFrame>
+    </p:spTree>
+    <p:extLst>
+      <p:ext uri="{BB962C8B-B14F-4D97-AF65-F5344CB8AC3E}">
+        <p14:creationId xmlns:p14="http://schemas.microsoft.com/office/powerpoint/2010/main" val="93967952"/>
+      </p:ext>
+    </p:extLst>
+  </p:cSld>
+  <p:clrMapOvr>
+    <a:masterClrMapping/>
+  </p:clrMapOvr>
+</p:sld>
+</file>
+
+<file path=ppt/slides/slide8.xml><?xml version="1.0" encoding="utf-8"?>
+<p:sld xmlns:a="http://schemas.openxmlformats.org/drawingml/2006/main" xmlns:r="http://schemas.openxmlformats.org/officeDocument/2006/relationships" xmlns:p="http://schemas.openxmlformats.org/presentationml/2006/main">
+  <p:cSld>
+    <p:spTree>
+      <p:nvGrpSpPr>
+        <p:cNvPr id="1" name=""/>
+        <p:cNvGrpSpPr/>
+        <p:nvPr/>
+      </p:nvGrpSpPr>
+      <p:grpSpPr>
+        <a:xfrm>
+          <a:off x="0" y="0"/>
+          <a:ext cx="0" cy="0"/>
+          <a:chOff x="0" y="0"/>
+          <a:chExt cx="0" cy="0"/>
+        </a:xfrm>
+      </p:grpSpPr>
+      <p:sp>
+        <p:nvSpPr>
+          <p:cNvPr id="3" name="Content Placeholder 2"/>
+          <p:cNvSpPr>
+            <a:spLocks noGrp="1"/>
+          </p:cNvSpPr>
+          <p:nvPr>
+            <p:ph idx="1"/>
+          </p:nvPr>
+        </p:nvSpPr>
+        <p:spPr>
+          <a:xfrm>
+            <a:off x="457200" y="548680"/>
+            <a:ext cx="8229600" cy="6192688"/>
+          </a:xfrm>
+        </p:spPr>
+        <p:txBody>
+          <a:bodyPr>
+            <a:normAutofit/>
+          </a:bodyPr>
+          <a:lstStyle/>
+          <a:p>
+            <a:r>
+              <a:rPr lang="en-GB" dirty="0"/>
+              <a:t>Meeting procedures</a:t>
+            </a:r>
+          </a:p>
+          <a:p>
+            <a:pPr lvl="1"/>
+            <a:endParaRPr lang="en-GB" dirty="0"/>
+          </a:p>
+          <a:p>
+            <a:pPr lvl="1"/>
+            <a:endParaRPr lang="en-GB" dirty="0"/>
+          </a:p>
+        </p:txBody>
+      </p:sp>
+      <p:pic>
+        <p:nvPicPr>
+          <p:cNvPr id="2" name="Picture 1">
+            <a:extLst>
+              <a:ext uri="{FF2B5EF4-FFF2-40B4-BE49-F238E27FC236}">
+                <a16:creationId xmlns:a16="http://schemas.microsoft.com/office/drawing/2014/main" id="{1439091E-848E-FC44-BEE8-F2CA34713B0D}"/>
+              </a:ext>
+            </a:extLst>
+          </p:cNvPr>
+          <p:cNvPicPr>
+            <a:picLocks noChangeAspect="1"/>
+          </p:cNvPicPr>
+          <p:nvPr/>
+        </p:nvPicPr>
+        <p:blipFill>
+          <a:blip r:embed="rId2"/>
+          <a:stretch>
+            <a:fillRect/>
+          </a:stretch>
+        </p:blipFill>
+        <p:spPr>
+          <a:xfrm>
+            <a:off x="982851" y="1484784"/>
+            <a:ext cx="3733165" cy="4536504"/>
+          </a:xfrm>
+          <a:prstGeom prst="rect">
+            <a:avLst/>
+          </a:prstGeom>
+        </p:spPr>
+      </p:pic>
+    </p:spTree>
+    <p:extLst>
+      <p:ext uri="{BB962C8B-B14F-4D97-AF65-F5344CB8AC3E}">
+        <p14:creationId xmlns:p14="http://schemas.microsoft.com/office/powerpoint/2010/main" val="2771742052"/>
+      </p:ext>
+    </p:extLst>
+  </p:cSld>
+  <p:clrMapOvr>
+    <a:masterClrMapping/>
+  </p:clrMapOvr>
+</p:sld>
+</file>
+
+<file path=ppt/slides/slide9.xml><?xml version="1.0" encoding="utf-8"?>
+<p:sld xmlns:a="http://schemas.openxmlformats.org/drawingml/2006/main" xmlns:r="http://schemas.openxmlformats.org/officeDocument/2006/relationships" xmlns:p="http://schemas.openxmlformats.org/presentationml/2006/main">
+  <p:cSld>
+    <p:spTree>
+      <p:nvGrpSpPr>
+        <p:cNvPr id="1" name=""/>
+        <p:cNvGrpSpPr/>
+        <p:nvPr/>
+      </p:nvGrpSpPr>
+      <p:grpSpPr>
+        <a:xfrm>
+          <a:off x="0" y="0"/>
+          <a:ext cx="0" cy="0"/>
+          <a:chOff x="0" y="0"/>
+          <a:chExt cx="0" cy="0"/>
+        </a:xfrm>
+      </p:grpSpPr>
+      <p:sp>
+        <p:nvSpPr>
+          <p:cNvPr id="3" name="Content Placeholder 2"/>
+          <p:cNvSpPr>
+            <a:spLocks noGrp="1"/>
+          </p:cNvSpPr>
+          <p:nvPr>
+            <p:ph idx="1"/>
+          </p:nvPr>
+        </p:nvSpPr>
+        <p:spPr>
+          <a:xfrm>
+            <a:off x="457200" y="548680"/>
+            <a:ext cx="8229600" cy="6192688"/>
+          </a:xfrm>
+        </p:spPr>
+        <p:txBody>
+          <a:bodyPr>
+            <a:normAutofit/>
+          </a:bodyPr>
+          <a:lstStyle/>
+          <a:p>
+            <a:r>
+              <a:rPr lang="en-GB" dirty="0"/>
+              <a:t>Meeting procedures</a:t>
+            </a:r>
+          </a:p>
+          <a:p>
+            <a:pPr lvl="1"/>
+            <a:endParaRPr lang="en-GB" dirty="0"/>
+          </a:p>
+          <a:p>
+            <a:pPr lvl="1"/>
+            <a:endParaRPr lang="en-GB" dirty="0"/>
+          </a:p>
+        </p:txBody>
+      </p:sp>
+      <p:pic>
+        <p:nvPicPr>
+          <p:cNvPr id="5" name="Picture 4">
+            <a:extLst>
+              <a:ext uri="{FF2B5EF4-FFF2-40B4-BE49-F238E27FC236}">
+                <a16:creationId xmlns:a16="http://schemas.microsoft.com/office/drawing/2014/main" id="{7D4EA95B-A43E-6D45-AA4E-5B4864884A5E}"/>
+              </a:ext>
+            </a:extLst>
+          </p:cNvPr>
+          <p:cNvPicPr>
+            <a:picLocks noChangeAspect="1"/>
+          </p:cNvPicPr>
+          <p:nvPr/>
+        </p:nvPicPr>
+        <p:blipFill rotWithShape="1">
+          <a:blip r:embed="rId2"/>
+          <a:srcRect b="41769"/>
+          <a:stretch/>
+        </p:blipFill>
+        <p:spPr>
+          <a:xfrm>
+            <a:off x="509154" y="1340768"/>
+            <a:ext cx="4020096" cy="4536504"/>
+          </a:xfrm>
+          <a:prstGeom prst="rect">
+            <a:avLst/>
+          </a:prstGeom>
+        </p:spPr>
+      </p:pic>
+      <p:pic>
+        <p:nvPicPr>
+          <p:cNvPr id="6" name="Picture 5">
+            <a:extLst>
+              <a:ext uri="{FF2B5EF4-FFF2-40B4-BE49-F238E27FC236}">
+                <a16:creationId xmlns:a16="http://schemas.microsoft.com/office/drawing/2014/main" id="{1CB41B1C-F7B1-7E41-A1B8-F65D2BCE2FB4}"/>
+              </a:ext>
+            </a:extLst>
+          </p:cNvPr>
+          <p:cNvPicPr>
+            <a:picLocks noChangeAspect="1"/>
+          </p:cNvPicPr>
+          <p:nvPr/>
+        </p:nvPicPr>
+        <p:blipFill rotWithShape="1">
+          <a:blip r:embed="rId2"/>
+          <a:srcRect t="57043"/>
+          <a:stretch/>
+        </p:blipFill>
+        <p:spPr>
+          <a:xfrm>
+            <a:off x="4800376" y="1340767"/>
+            <a:ext cx="4020096" cy="3346573"/>
+          </a:xfrm>
+          <a:prstGeom prst="rect">
+            <a:avLst/>
+          </a:prstGeom>
+        </p:spPr>
+      </p:pic>
+    </p:spTree>
+    <p:extLst>
+      <p:ext uri="{BB962C8B-B14F-4D97-AF65-F5344CB8AC3E}">
+        <p14:creationId xmlns:p14="http://schemas.microsoft.com/office/powerpoint/2010/main" val="2085630954"/>
+      </p:ext>
+    </p:extLst>
   </p:cSld>
   <p:clrMapOvr>
     <a:masterClrMapping/>

</xml_diff>